<commit_message>
Update 2022 02 26
</commit_message>
<xml_diff>
--- a/DATOS COVID Chile 2022 02 19.pptx
+++ b/DATOS COVID Chile 2022 02 19.pptx
@@ -5,7 +5,7 @@
     <p:sldMasterId id="2147483648" r:id="rId1"/>
   </p:sldMasterIdLst>
   <p:notesMasterIdLst>
-    <p:notesMasterId r:id="rId27"/>
+    <p:notesMasterId r:id="rId30"/>
   </p:notesMasterIdLst>
   <p:sldIdLst>
     <p:sldId id="266" r:id="rId2"/>
@@ -18,21 +18,24 @@
     <p:sldId id="452" r:id="rId9"/>
     <p:sldId id="458" r:id="rId10"/>
     <p:sldId id="277" r:id="rId11"/>
-    <p:sldId id="449" r:id="rId12"/>
-    <p:sldId id="426" r:id="rId13"/>
-    <p:sldId id="280" r:id="rId14"/>
-    <p:sldId id="281" r:id="rId15"/>
-    <p:sldId id="417" r:id="rId16"/>
-    <p:sldId id="431" r:id="rId17"/>
-    <p:sldId id="438" r:id="rId18"/>
-    <p:sldId id="457" r:id="rId19"/>
-    <p:sldId id="456" r:id="rId20"/>
-    <p:sldId id="407" r:id="rId21"/>
-    <p:sldId id="288" r:id="rId22"/>
-    <p:sldId id="300" r:id="rId23"/>
-    <p:sldId id="440" r:id="rId24"/>
-    <p:sldId id="451" r:id="rId25"/>
-    <p:sldId id="424" r:id="rId26"/>
+    <p:sldId id="461" r:id="rId12"/>
+    <p:sldId id="449" r:id="rId13"/>
+    <p:sldId id="426" r:id="rId14"/>
+    <p:sldId id="280" r:id="rId15"/>
+    <p:sldId id="281" r:id="rId16"/>
+    <p:sldId id="417" r:id="rId17"/>
+    <p:sldId id="431" r:id="rId18"/>
+    <p:sldId id="438" r:id="rId19"/>
+    <p:sldId id="457" r:id="rId20"/>
+    <p:sldId id="456" r:id="rId21"/>
+    <p:sldId id="459" r:id="rId22"/>
+    <p:sldId id="460" r:id="rId23"/>
+    <p:sldId id="407" r:id="rId24"/>
+    <p:sldId id="288" r:id="rId25"/>
+    <p:sldId id="300" r:id="rId26"/>
+    <p:sldId id="440" r:id="rId27"/>
+    <p:sldId id="451" r:id="rId28"/>
+    <p:sldId id="424" r:id="rId29"/>
   </p:sldIdLst>
   <p:sldSz cx="12192000" cy="6858000"/>
   <p:notesSz cx="6858000" cy="9144000"/>
@@ -1169,7 +1172,7 @@
           <a:p>
             <a:fld id="{843DCC2D-BF8E-6546-A31C-967437B0E67F}" type="slidenum">
               <a:rPr lang="en-US" smtClean="0"/>
-              <a:t>11</a:t>
+              <a:t>12</a:t>
             </a:fld>
             <a:endParaRPr lang="en-US"/>
           </a:p>
@@ -1341,7 +1344,7 @@
           <a:p>
             <a:fld id="{843DCC2D-BF8E-6546-A31C-967437B0E67F}" type="slidenum">
               <a:rPr lang="en-US" smtClean="0"/>
-              <a:t>12</a:t>
+              <a:t>13</a:t>
             </a:fld>
             <a:endParaRPr lang="en-US"/>
           </a:p>
@@ -1457,7 +1460,7 @@
           <a:p>
             <a:fld id="{843DCC2D-BF8E-6546-A31C-967437B0E67F}" type="slidenum">
               <a:rPr lang="en-US" smtClean="0"/>
-              <a:t>14</a:t>
+              <a:t>15</a:t>
             </a:fld>
             <a:endParaRPr lang="en-US"/>
           </a:p>
@@ -1573,7 +1576,7 @@
           <a:p>
             <a:fld id="{843DCC2D-BF8E-6546-A31C-967437B0E67F}" type="slidenum">
               <a:rPr lang="en-US" smtClean="0"/>
-              <a:t>15</a:t>
+              <a:t>16</a:t>
             </a:fld>
             <a:endParaRPr lang="en-US"/>
           </a:p>
@@ -5122,48 +5125,94 @@
       </p:grpSpPr>
       <p:sp>
         <p:nvSpPr>
-          <p:cNvPr id="6" name="TextBox 5">
-            <a:extLst>
-              <a:ext uri="{FF2B5EF4-FFF2-40B4-BE49-F238E27FC236}">
-                <a16:creationId xmlns:a16="http://schemas.microsoft.com/office/drawing/2014/main" id="{AB65407A-4582-004A-A45F-BD87B99ABAF2}"/>
-              </a:ext>
-            </a:extLst>
-          </p:cNvPr>
-          <p:cNvSpPr txBox="1"/>
+          <p:cNvPr id="2" name="Title 1">
+            <a:extLst>
+              <a:ext uri="{FF2B5EF4-FFF2-40B4-BE49-F238E27FC236}">
+                <a16:creationId xmlns:a16="http://schemas.microsoft.com/office/drawing/2014/main" id="{C414F2AE-7374-C147-A045-CCEB3603BAD1}"/>
+              </a:ext>
+            </a:extLst>
+          </p:cNvPr>
+          <p:cNvSpPr>
+            <a:spLocks noGrp="1"/>
+          </p:cNvSpPr>
+          <p:nvPr>
+            <p:ph type="title"/>
+          </p:nvPr>
+        </p:nvSpPr>
+        <p:spPr>
+          <a:xfrm>
+            <a:off x="637558" y="-150047"/>
+            <a:ext cx="10515600" cy="1325563"/>
+          </a:xfrm>
+        </p:spPr>
+        <p:txBody>
+          <a:bodyPr/>
+          <a:lstStyle/>
+          <a:p>
+            <a:pPr algn="ctr"/>
+            <a:r>
+              <a:rPr lang="en-US" dirty="0"/>
+              <a:t>Casos </a:t>
+            </a:r>
+            <a:r>
+              <a:rPr lang="en-US" dirty="0" err="1"/>
+              <a:t>Semanales</a:t>
+            </a:r>
+            <a:r>
+              <a:rPr lang="en-US" dirty="0"/>
+              <a:t>, </a:t>
+            </a:r>
+            <a:r>
+              <a:rPr lang="en-US" dirty="0" err="1"/>
+              <a:t>Diarios</a:t>
+            </a:r>
+            <a:r>
+              <a:rPr lang="en-US" dirty="0"/>
+              <a:t> e </a:t>
+            </a:r>
+            <a:r>
+              <a:rPr lang="en-US" dirty="0" err="1"/>
+              <a:t>Incidencia</a:t>
+            </a:r>
+            <a:endParaRPr lang="en-US" dirty="0"/>
+          </a:p>
+        </p:txBody>
+      </p:sp>
+      <p:pic>
+        <p:nvPicPr>
+          <p:cNvPr id="3" name="Picture 2">
+            <a:extLst>
+              <a:ext uri="{FF2B5EF4-FFF2-40B4-BE49-F238E27FC236}">
+                <a16:creationId xmlns:a16="http://schemas.microsoft.com/office/drawing/2014/main" id="{1773CE84-7DC9-6D4C-AECD-FD30CB9D853C}"/>
+              </a:ext>
+            </a:extLst>
+          </p:cNvPr>
+          <p:cNvPicPr>
+            <a:picLocks noChangeAspect="1"/>
+          </p:cNvPicPr>
           <p:nvPr/>
-        </p:nvSpPr>
-        <p:spPr>
-          <a:xfrm>
-            <a:off x="2627010" y="128200"/>
-            <a:ext cx="6937980" cy="584775"/>
+        </p:nvPicPr>
+        <p:blipFill rotWithShape="1">
+          <a:blip r:embed="rId2"/>
+          <a:srcRect r="1654"/>
+          <a:stretch/>
+        </p:blipFill>
+        <p:spPr>
+          <a:xfrm>
+            <a:off x="357983" y="1581563"/>
+            <a:ext cx="2373086" cy="1676400"/>
           </a:xfrm>
           <a:prstGeom prst="rect">
             <a:avLst/>
           </a:prstGeom>
-          <a:solidFill>
-            <a:schemeClr val="bg1"/>
-          </a:solidFill>
-        </p:spPr>
-        <p:txBody>
-          <a:bodyPr wrap="square" rtlCol="0">
-            <a:spAutoFit/>
-          </a:bodyPr>
-          <a:lstStyle/>
-          <a:p>
-            <a:pPr algn="ctr"/>
-            <a:r>
-              <a:rPr lang="en-US" sz="3200" dirty="0"/>
-              <a:t>CASOS CONFIRMADOS POR SEMANA </a:t>
-            </a:r>
-          </a:p>
-        </p:txBody>
-      </p:sp>
+        </p:spPr>
+      </p:pic>
       <p:pic>
         <p:nvPicPr>
-          <p:cNvPr id="2" name="Picture 1">
-            <a:extLst>
-              <a:ext uri="{FF2B5EF4-FFF2-40B4-BE49-F238E27FC236}">
-                <a16:creationId xmlns:a16="http://schemas.microsoft.com/office/drawing/2014/main" id="{38804368-A689-054B-8049-9AC162781A5D}"/>
+          <p:cNvPr id="4" name="Picture 3">
+            <a:extLst>
+              <a:ext uri="{FF2B5EF4-FFF2-40B4-BE49-F238E27FC236}">
+                <a16:creationId xmlns:a16="http://schemas.microsoft.com/office/drawing/2014/main" id="{BE276216-91D2-E14B-AD5F-3188F18C7C46}"/>
               </a:ext>
             </a:extLst>
           </p:cNvPr>
@@ -5180,18 +5229,966 @@
         </p:blipFill>
         <p:spPr>
           <a:xfrm>
-            <a:off x="2197100" y="590550"/>
-            <a:ext cx="7797800" cy="5676900"/>
+            <a:off x="368869" y="1167905"/>
+            <a:ext cx="2362200" cy="457200"/>
           </a:xfrm>
           <a:prstGeom prst="rect">
             <a:avLst/>
           </a:prstGeom>
         </p:spPr>
       </p:pic>
+      <p:sp>
+        <p:nvSpPr>
+          <p:cNvPr id="5" name="TextBox 4">
+            <a:extLst>
+              <a:ext uri="{FF2B5EF4-FFF2-40B4-BE49-F238E27FC236}">
+                <a16:creationId xmlns:a16="http://schemas.microsoft.com/office/drawing/2014/main" id="{0D59367D-CC7A-994E-9FD9-588FBF40FA38}"/>
+              </a:ext>
+            </a:extLst>
+          </p:cNvPr>
+          <p:cNvSpPr txBox="1"/>
+          <p:nvPr/>
+        </p:nvSpPr>
+        <p:spPr>
+          <a:xfrm>
+            <a:off x="3665680" y="1612595"/>
+            <a:ext cx="2000356" cy="369332"/>
+          </a:xfrm>
+          <a:prstGeom prst="rect">
+            <a:avLst/>
+          </a:prstGeom>
+          <a:noFill/>
+        </p:spPr>
+        <p:txBody>
+          <a:bodyPr wrap="none" rtlCol="0">
+            <a:spAutoFit/>
+          </a:bodyPr>
+          <a:lstStyle/>
+          <a:p>
+            <a:r>
+              <a:rPr lang="en-US" dirty="0" err="1"/>
+              <a:t>Sábado</a:t>
+            </a:r>
+            <a:r>
+              <a:rPr lang="en-US" dirty="0"/>
+              <a:t> 19 </a:t>
+            </a:r>
+            <a:r>
+              <a:rPr lang="en-US" dirty="0" err="1"/>
+              <a:t>Febrero</a:t>
+            </a:r>
+            <a:r>
+              <a:rPr lang="en-US" dirty="0"/>
+              <a:t> </a:t>
+            </a:r>
+          </a:p>
+        </p:txBody>
+      </p:sp>
+      <p:sp>
+        <p:nvSpPr>
+          <p:cNvPr id="6" name="TextBox 5">
+            <a:extLst>
+              <a:ext uri="{FF2B5EF4-FFF2-40B4-BE49-F238E27FC236}">
+                <a16:creationId xmlns:a16="http://schemas.microsoft.com/office/drawing/2014/main" id="{B275FA94-637A-7343-A8AC-E5C294A395C9}"/>
+              </a:ext>
+            </a:extLst>
+          </p:cNvPr>
+          <p:cNvSpPr txBox="1"/>
+          <p:nvPr/>
+        </p:nvSpPr>
+        <p:spPr>
+          <a:xfrm>
+            <a:off x="5666036" y="1517898"/>
+            <a:ext cx="1646605" cy="523220"/>
+          </a:xfrm>
+          <a:prstGeom prst="rect">
+            <a:avLst/>
+          </a:prstGeom>
+          <a:noFill/>
+        </p:spPr>
+        <p:txBody>
+          <a:bodyPr wrap="none" rtlCol="0">
+            <a:spAutoFit/>
+          </a:bodyPr>
+          <a:lstStyle/>
+          <a:p>
+            <a:r>
+              <a:rPr lang="en-US" sz="2800" dirty="0"/>
+              <a:t>2.819.246</a:t>
+            </a:r>
+          </a:p>
+        </p:txBody>
+      </p:sp>
+      <p:sp>
+        <p:nvSpPr>
+          <p:cNvPr id="7" name="TextBox 6">
+            <a:extLst>
+              <a:ext uri="{FF2B5EF4-FFF2-40B4-BE49-F238E27FC236}">
+                <a16:creationId xmlns:a16="http://schemas.microsoft.com/office/drawing/2014/main" id="{8AD85E33-10E4-B644-8F94-DDEBEACCFABF}"/>
+              </a:ext>
+            </a:extLst>
+          </p:cNvPr>
+          <p:cNvSpPr txBox="1"/>
+          <p:nvPr/>
+        </p:nvSpPr>
+        <p:spPr>
+          <a:xfrm>
+            <a:off x="3665680" y="2247243"/>
+            <a:ext cx="2000356" cy="369332"/>
+          </a:xfrm>
+          <a:prstGeom prst="rect">
+            <a:avLst/>
+          </a:prstGeom>
+          <a:noFill/>
+        </p:spPr>
+        <p:txBody>
+          <a:bodyPr wrap="none" rtlCol="0">
+            <a:spAutoFit/>
+          </a:bodyPr>
+          <a:lstStyle/>
+          <a:p>
+            <a:r>
+              <a:rPr lang="en-US" dirty="0" err="1"/>
+              <a:t>Sábado</a:t>
+            </a:r>
+            <a:r>
+              <a:rPr lang="en-US" dirty="0"/>
+              <a:t> 12 </a:t>
+            </a:r>
+            <a:r>
+              <a:rPr lang="en-US" dirty="0" err="1"/>
+              <a:t>Febrero</a:t>
+            </a:r>
+            <a:r>
+              <a:rPr lang="en-US" dirty="0"/>
+              <a:t> </a:t>
+            </a:r>
+          </a:p>
+        </p:txBody>
+      </p:sp>
+      <p:sp>
+        <p:nvSpPr>
+          <p:cNvPr id="8" name="TextBox 7">
+            <a:extLst>
+              <a:ext uri="{FF2B5EF4-FFF2-40B4-BE49-F238E27FC236}">
+                <a16:creationId xmlns:a16="http://schemas.microsoft.com/office/drawing/2014/main" id="{98EA4EDC-E7F3-1549-8CF0-E5FB9D376F10}"/>
+              </a:ext>
+            </a:extLst>
+          </p:cNvPr>
+          <p:cNvSpPr txBox="1"/>
+          <p:nvPr/>
+        </p:nvSpPr>
+        <p:spPr>
+          <a:xfrm>
+            <a:off x="5666036" y="2152546"/>
+            <a:ext cx="1646605" cy="523220"/>
+          </a:xfrm>
+          <a:prstGeom prst="rect">
+            <a:avLst/>
+          </a:prstGeom>
+          <a:noFill/>
+        </p:spPr>
+        <p:txBody>
+          <a:bodyPr wrap="none" rtlCol="0">
+            <a:spAutoFit/>
+          </a:bodyPr>
+          <a:lstStyle/>
+          <a:p>
+            <a:r>
+              <a:rPr lang="en-US" sz="2800" dirty="0"/>
+              <a:t>2.582.934</a:t>
+            </a:r>
+          </a:p>
+        </p:txBody>
+      </p:sp>
+      <p:sp>
+        <p:nvSpPr>
+          <p:cNvPr id="9" name="Right Brace 8">
+            <a:extLst>
+              <a:ext uri="{FF2B5EF4-FFF2-40B4-BE49-F238E27FC236}">
+                <a16:creationId xmlns:a16="http://schemas.microsoft.com/office/drawing/2014/main" id="{06EDAF4D-9E4D-FF4F-B7FC-2516F4A4850D}"/>
+              </a:ext>
+            </a:extLst>
+          </p:cNvPr>
+          <p:cNvSpPr/>
+          <p:nvPr/>
+        </p:nvSpPr>
+        <p:spPr>
+          <a:xfrm>
+            <a:off x="7312641" y="1517898"/>
+            <a:ext cx="134504" cy="1157868"/>
+          </a:xfrm>
+          <a:prstGeom prst="rightBrace">
+            <a:avLst/>
+          </a:prstGeom>
+          <a:ln w="28575"/>
+        </p:spPr>
+        <p:style>
+          <a:lnRef idx="1">
+            <a:schemeClr val="accent1"/>
+          </a:lnRef>
+          <a:fillRef idx="0">
+            <a:schemeClr val="accent1"/>
+          </a:fillRef>
+          <a:effectRef idx="0">
+            <a:schemeClr val="accent1"/>
+          </a:effectRef>
+          <a:fontRef idx="minor">
+            <a:schemeClr val="tx1"/>
+          </a:fontRef>
+        </p:style>
+        <p:txBody>
+          <a:bodyPr rtlCol="0" anchor="ctr"/>
+          <a:lstStyle/>
+          <a:p>
+            <a:pPr algn="ctr"/>
+            <a:endParaRPr lang="en-US"/>
+          </a:p>
+        </p:txBody>
+      </p:sp>
+      <p:sp>
+        <p:nvSpPr>
+          <p:cNvPr id="10" name="Rectangle 9">
+            <a:extLst>
+              <a:ext uri="{FF2B5EF4-FFF2-40B4-BE49-F238E27FC236}">
+                <a16:creationId xmlns:a16="http://schemas.microsoft.com/office/drawing/2014/main" id="{B792ED62-39BA-7E42-8DA0-125BE568C749}"/>
+              </a:ext>
+            </a:extLst>
+          </p:cNvPr>
+          <p:cNvSpPr/>
+          <p:nvPr/>
+        </p:nvSpPr>
+        <p:spPr>
+          <a:xfrm>
+            <a:off x="7647729" y="1435112"/>
+            <a:ext cx="3762568" cy="1323439"/>
+          </a:xfrm>
+          <a:prstGeom prst="rect">
+            <a:avLst/>
+          </a:prstGeom>
+        </p:spPr>
+        <p:txBody>
+          <a:bodyPr wrap="none">
+            <a:spAutoFit/>
+          </a:bodyPr>
+          <a:lstStyle/>
+          <a:p>
+            <a:pPr algn="ctr"/>
+            <a:r>
+              <a:rPr lang="en-US" sz="4000" b="1" dirty="0">
+                <a:solidFill>
+                  <a:srgbClr val="FE0102"/>
+                </a:solidFill>
+              </a:rPr>
+              <a:t>236.312</a:t>
+            </a:r>
+          </a:p>
+          <a:p>
+            <a:pPr algn="ctr"/>
+            <a:r>
+              <a:rPr lang="en-US" sz="4000" b="1" dirty="0">
+                <a:solidFill>
+                  <a:srgbClr val="FE0102"/>
+                </a:solidFill>
+              </a:rPr>
+              <a:t>Casos </a:t>
+            </a:r>
+            <a:r>
+              <a:rPr lang="en-US" sz="4000" b="1" dirty="0" err="1">
+                <a:solidFill>
+                  <a:srgbClr val="FE0102"/>
+                </a:solidFill>
+              </a:rPr>
+              <a:t>semanales</a:t>
+            </a:r>
+            <a:endParaRPr lang="en-US" sz="4000" b="1" dirty="0">
+              <a:solidFill>
+                <a:srgbClr val="FE0102"/>
+              </a:solidFill>
+            </a:endParaRPr>
+          </a:p>
+        </p:txBody>
+      </p:sp>
+      <p:sp>
+        <p:nvSpPr>
+          <p:cNvPr id="11" name="Rectangle 10">
+            <a:extLst>
+              <a:ext uri="{FF2B5EF4-FFF2-40B4-BE49-F238E27FC236}">
+                <a16:creationId xmlns:a16="http://schemas.microsoft.com/office/drawing/2014/main" id="{D415A520-F25B-9C45-9BAE-3D22A78992F9}"/>
+              </a:ext>
+            </a:extLst>
+          </p:cNvPr>
+          <p:cNvSpPr/>
+          <p:nvPr/>
+        </p:nvSpPr>
+        <p:spPr>
+          <a:xfrm>
+            <a:off x="6688972" y="4071594"/>
+            <a:ext cx="1917513" cy="461665"/>
+          </a:xfrm>
+          <a:prstGeom prst="rect">
+            <a:avLst/>
+          </a:prstGeom>
+        </p:spPr>
+        <p:txBody>
+          <a:bodyPr wrap="none">
+            <a:spAutoFit/>
+          </a:bodyPr>
+          <a:lstStyle/>
+          <a:p>
+            <a:pPr algn="ctr"/>
+            <a:r>
+              <a:rPr lang="en-US" sz="2400" b="1" dirty="0">
+                <a:solidFill>
+                  <a:srgbClr val="FE0102"/>
+                </a:solidFill>
+              </a:rPr>
+              <a:t>236.312 / 7 = </a:t>
+            </a:r>
+          </a:p>
+        </p:txBody>
+      </p:sp>
+      <p:sp>
+        <p:nvSpPr>
+          <p:cNvPr id="13" name="Rectangle 12">
+            <a:extLst>
+              <a:ext uri="{FF2B5EF4-FFF2-40B4-BE49-F238E27FC236}">
+                <a16:creationId xmlns:a16="http://schemas.microsoft.com/office/drawing/2014/main" id="{B0045032-A7C7-1E42-B318-1269F11CDC60}"/>
+              </a:ext>
+            </a:extLst>
+          </p:cNvPr>
+          <p:cNvSpPr/>
+          <p:nvPr/>
+        </p:nvSpPr>
+        <p:spPr>
+          <a:xfrm>
+            <a:off x="8606485" y="3948483"/>
+            <a:ext cx="1619354" cy="707886"/>
+          </a:xfrm>
+          <a:prstGeom prst="rect">
+            <a:avLst/>
+          </a:prstGeom>
+        </p:spPr>
+        <p:txBody>
+          <a:bodyPr wrap="none">
+            <a:spAutoFit/>
+          </a:bodyPr>
+          <a:lstStyle/>
+          <a:p>
+            <a:pPr algn="ctr"/>
+            <a:r>
+              <a:rPr lang="en-US" sz="4000" b="1" dirty="0">
+                <a:solidFill>
+                  <a:srgbClr val="FE0102"/>
+                </a:solidFill>
+              </a:rPr>
+              <a:t>33.758</a:t>
+            </a:r>
+          </a:p>
+        </p:txBody>
+      </p:sp>
+      <p:sp>
+        <p:nvSpPr>
+          <p:cNvPr id="16" name="Rectangle 15">
+            <a:extLst>
+              <a:ext uri="{FF2B5EF4-FFF2-40B4-BE49-F238E27FC236}">
+                <a16:creationId xmlns:a16="http://schemas.microsoft.com/office/drawing/2014/main" id="{733ECC15-79A6-464A-B865-7282AA72D5A5}"/>
+              </a:ext>
+            </a:extLst>
+          </p:cNvPr>
+          <p:cNvSpPr/>
+          <p:nvPr/>
+        </p:nvSpPr>
+        <p:spPr>
+          <a:xfrm>
+            <a:off x="3260413" y="4010039"/>
+            <a:ext cx="2586414" cy="523220"/>
+          </a:xfrm>
+          <a:prstGeom prst="rect">
+            <a:avLst/>
+          </a:prstGeom>
+        </p:spPr>
+        <p:txBody>
+          <a:bodyPr wrap="none">
+            <a:spAutoFit/>
+          </a:bodyPr>
+          <a:lstStyle/>
+          <a:p>
+            <a:pPr algn="ctr"/>
+            <a:r>
+              <a:rPr lang="en-US" sz="2800" b="1" dirty="0" err="1">
+                <a:solidFill>
+                  <a:srgbClr val="FE0102"/>
+                </a:solidFill>
+              </a:rPr>
+              <a:t>Promedio</a:t>
+            </a:r>
+            <a:r>
+              <a:rPr lang="en-US" sz="2800" b="1" dirty="0">
+                <a:solidFill>
+                  <a:srgbClr val="FE0102"/>
+                </a:solidFill>
+              </a:rPr>
+              <a:t> </a:t>
+            </a:r>
+            <a:r>
+              <a:rPr lang="en-US" sz="2800" b="1" dirty="0" err="1">
+                <a:solidFill>
+                  <a:srgbClr val="FE0102"/>
+                </a:solidFill>
+              </a:rPr>
+              <a:t>diario</a:t>
+            </a:r>
+            <a:endParaRPr lang="en-US" sz="2800" b="1" dirty="0">
+              <a:solidFill>
+                <a:srgbClr val="FE0102"/>
+              </a:solidFill>
+            </a:endParaRPr>
+          </a:p>
+        </p:txBody>
+      </p:sp>
+      <p:sp>
+        <p:nvSpPr>
+          <p:cNvPr id="17" name="Rectangle 16">
+            <a:extLst>
+              <a:ext uri="{FF2B5EF4-FFF2-40B4-BE49-F238E27FC236}">
+                <a16:creationId xmlns:a16="http://schemas.microsoft.com/office/drawing/2014/main" id="{484B92E3-5930-AC46-8A7B-9DD4C1DD396F}"/>
+              </a:ext>
+            </a:extLst>
+          </p:cNvPr>
+          <p:cNvSpPr/>
+          <p:nvPr/>
+        </p:nvSpPr>
+        <p:spPr>
+          <a:xfrm>
+            <a:off x="6489338" y="5014371"/>
+            <a:ext cx="5222905" cy="707886"/>
+          </a:xfrm>
+          <a:prstGeom prst="rect">
+            <a:avLst/>
+          </a:prstGeom>
+        </p:spPr>
+        <p:txBody>
+          <a:bodyPr wrap="none">
+            <a:spAutoFit/>
+          </a:bodyPr>
+          <a:lstStyle/>
+          <a:p>
+            <a:pPr algn="ctr"/>
+            <a:r>
+              <a:rPr lang="en-US" sz="4000" b="1" dirty="0">
+                <a:solidFill>
+                  <a:srgbClr val="FE0102"/>
+                </a:solidFill>
+              </a:rPr>
+              <a:t>33.758 </a:t>
+            </a:r>
+            <a:r>
+              <a:rPr lang="en-US" sz="4000" b="1" dirty="0" err="1">
+                <a:solidFill>
+                  <a:srgbClr val="FE0102"/>
+                </a:solidFill>
+              </a:rPr>
+              <a:t>en</a:t>
+            </a:r>
+            <a:r>
+              <a:rPr lang="en-US" sz="4000" b="1" dirty="0">
+                <a:solidFill>
+                  <a:srgbClr val="FE0102"/>
+                </a:solidFill>
+              </a:rPr>
+              <a:t> 19,8 </a:t>
+            </a:r>
+            <a:r>
+              <a:rPr lang="en-US" sz="4000" b="1" dirty="0" err="1">
+                <a:solidFill>
+                  <a:srgbClr val="FE0102"/>
+                </a:solidFill>
+              </a:rPr>
+              <a:t>millones</a:t>
+            </a:r>
+            <a:endParaRPr lang="en-US" sz="4000" b="1" dirty="0">
+              <a:solidFill>
+                <a:srgbClr val="FE0102"/>
+              </a:solidFill>
+            </a:endParaRPr>
+          </a:p>
+        </p:txBody>
+      </p:sp>
+      <p:sp>
+        <p:nvSpPr>
+          <p:cNvPr id="18" name="Rectangle 17">
+            <a:extLst>
+              <a:ext uri="{FF2B5EF4-FFF2-40B4-BE49-F238E27FC236}">
+                <a16:creationId xmlns:a16="http://schemas.microsoft.com/office/drawing/2014/main" id="{CEA262DD-48D5-C34A-A6D5-ADC5C5DD9CA5}"/>
+              </a:ext>
+            </a:extLst>
+          </p:cNvPr>
+          <p:cNvSpPr/>
+          <p:nvPr/>
+        </p:nvSpPr>
+        <p:spPr>
+          <a:xfrm>
+            <a:off x="6763672" y="5726316"/>
+            <a:ext cx="3685625" cy="707886"/>
+          </a:xfrm>
+          <a:prstGeom prst="rect">
+            <a:avLst/>
+          </a:prstGeom>
+        </p:spPr>
+        <p:txBody>
+          <a:bodyPr wrap="none">
+            <a:spAutoFit/>
+          </a:bodyPr>
+          <a:lstStyle/>
+          <a:p>
+            <a:pPr algn="ctr"/>
+            <a:r>
+              <a:rPr lang="en-US" sz="4000" b="1" dirty="0">
+                <a:solidFill>
+                  <a:srgbClr val="FE0102"/>
+                </a:solidFill>
+              </a:rPr>
+              <a:t>170,3 </a:t>
+            </a:r>
+            <a:r>
+              <a:rPr lang="en-US" sz="4000" b="1" dirty="0" err="1">
+                <a:solidFill>
+                  <a:srgbClr val="FE0102"/>
+                </a:solidFill>
+              </a:rPr>
+              <a:t>en</a:t>
+            </a:r>
+            <a:r>
+              <a:rPr lang="en-US" sz="4000" b="1" dirty="0">
+                <a:solidFill>
+                  <a:srgbClr val="FE0102"/>
+                </a:solidFill>
+              </a:rPr>
+              <a:t> 100 mil</a:t>
+            </a:r>
+          </a:p>
+        </p:txBody>
+      </p:sp>
+      <p:cxnSp>
+        <p:nvCxnSpPr>
+          <p:cNvPr id="20" name="Straight Connector 19">
+            <a:extLst>
+              <a:ext uri="{FF2B5EF4-FFF2-40B4-BE49-F238E27FC236}">
+                <a16:creationId xmlns:a16="http://schemas.microsoft.com/office/drawing/2014/main" id="{C8141BC8-6801-3445-85FB-5FFE07154E11}"/>
+              </a:ext>
+            </a:extLst>
+          </p:cNvPr>
+          <p:cNvCxnSpPr>
+            <a:cxnSpLocks/>
+          </p:cNvCxnSpPr>
+          <p:nvPr/>
+        </p:nvCxnSpPr>
+        <p:spPr>
+          <a:xfrm>
+            <a:off x="2428394" y="5746696"/>
+            <a:ext cx="850332" cy="0"/>
+          </a:xfrm>
+          <a:prstGeom prst="line">
+            <a:avLst/>
+          </a:prstGeom>
+        </p:spPr>
+        <p:style>
+          <a:lnRef idx="1">
+            <a:schemeClr val="accent1"/>
+          </a:lnRef>
+          <a:fillRef idx="0">
+            <a:schemeClr val="accent1"/>
+          </a:fillRef>
+          <a:effectRef idx="0">
+            <a:schemeClr val="accent1"/>
+          </a:effectRef>
+          <a:fontRef idx="minor">
+            <a:schemeClr val="tx1"/>
+          </a:fontRef>
+        </p:style>
+      </p:cxnSp>
+      <p:sp>
+        <p:nvSpPr>
+          <p:cNvPr id="21" name="Rectangle 20">
+            <a:extLst>
+              <a:ext uri="{FF2B5EF4-FFF2-40B4-BE49-F238E27FC236}">
+                <a16:creationId xmlns:a16="http://schemas.microsoft.com/office/drawing/2014/main" id="{78B14944-84D8-0349-B26E-B44AF68D1548}"/>
+              </a:ext>
+            </a:extLst>
+          </p:cNvPr>
+          <p:cNvSpPr/>
+          <p:nvPr/>
+        </p:nvSpPr>
+        <p:spPr>
+          <a:xfrm>
+            <a:off x="2689761" y="5755683"/>
+            <a:ext cx="301686" cy="369332"/>
+          </a:xfrm>
+          <a:prstGeom prst="rect">
+            <a:avLst/>
+          </a:prstGeom>
+        </p:spPr>
+        <p:txBody>
+          <a:bodyPr wrap="none">
+            <a:spAutoFit/>
+          </a:bodyPr>
+          <a:lstStyle/>
+          <a:p>
+            <a:r>
+              <a:rPr lang="en-CL" dirty="0"/>
+              <a:t>7</a:t>
+            </a:r>
+            <a:endParaRPr lang="en-US" dirty="0"/>
+          </a:p>
+        </p:txBody>
+      </p:sp>
+      <p:sp>
+        <p:nvSpPr>
+          <p:cNvPr id="22" name="Rectangle 21">
+            <a:extLst>
+              <a:ext uri="{FF2B5EF4-FFF2-40B4-BE49-F238E27FC236}">
+                <a16:creationId xmlns:a16="http://schemas.microsoft.com/office/drawing/2014/main" id="{14E6D3D7-1B58-B449-8F42-83457BA70123}"/>
+              </a:ext>
+            </a:extLst>
+          </p:cNvPr>
+          <p:cNvSpPr/>
+          <p:nvPr/>
+        </p:nvSpPr>
+        <p:spPr>
+          <a:xfrm>
+            <a:off x="2420182" y="5404169"/>
+            <a:ext cx="997389" cy="369332"/>
+          </a:xfrm>
+          <a:prstGeom prst="rect">
+            <a:avLst/>
+          </a:prstGeom>
+        </p:spPr>
+        <p:txBody>
+          <a:bodyPr wrap="none">
+            <a:spAutoFit/>
+          </a:bodyPr>
+          <a:lstStyle/>
+          <a:p>
+            <a:r>
+              <a:rPr lang="en-CL" dirty="0"/>
+              <a:t>236.312 </a:t>
+            </a:r>
+            <a:endParaRPr lang="en-US" dirty="0"/>
+          </a:p>
+        </p:txBody>
+      </p:sp>
+      <p:sp>
+        <p:nvSpPr>
+          <p:cNvPr id="25" name="TextBox 24">
+            <a:extLst>
+              <a:ext uri="{FF2B5EF4-FFF2-40B4-BE49-F238E27FC236}">
+                <a16:creationId xmlns:a16="http://schemas.microsoft.com/office/drawing/2014/main" id="{976B3DC5-1893-7648-AB8D-6410683E11A6}"/>
+              </a:ext>
+            </a:extLst>
+          </p:cNvPr>
+          <p:cNvSpPr txBox="1"/>
+          <p:nvPr/>
+        </p:nvSpPr>
+        <p:spPr>
+          <a:xfrm>
+            <a:off x="3352416" y="5562030"/>
+            <a:ext cx="284052" cy="369332"/>
+          </a:xfrm>
+          <a:prstGeom prst="rect">
+            <a:avLst/>
+          </a:prstGeom>
+          <a:noFill/>
+        </p:spPr>
+        <p:txBody>
+          <a:bodyPr wrap="none" rtlCol="0">
+            <a:spAutoFit/>
+          </a:bodyPr>
+          <a:lstStyle/>
+          <a:p>
+            <a:r>
+              <a:rPr lang="en-US" dirty="0"/>
+              <a:t>x</a:t>
+            </a:r>
+          </a:p>
+        </p:txBody>
+      </p:sp>
+      <p:sp>
+        <p:nvSpPr>
+          <p:cNvPr id="26" name="Rectangle 25">
+            <a:extLst>
+              <a:ext uri="{FF2B5EF4-FFF2-40B4-BE49-F238E27FC236}">
+                <a16:creationId xmlns:a16="http://schemas.microsoft.com/office/drawing/2014/main" id="{0268093C-C721-0C43-9758-2FA15C50E2FD}"/>
+              </a:ext>
+            </a:extLst>
+          </p:cNvPr>
+          <p:cNvSpPr/>
+          <p:nvPr/>
+        </p:nvSpPr>
+        <p:spPr>
+          <a:xfrm>
+            <a:off x="3794812" y="5377364"/>
+            <a:ext cx="997389" cy="369332"/>
+          </a:xfrm>
+          <a:prstGeom prst="rect">
+            <a:avLst/>
+          </a:prstGeom>
+        </p:spPr>
+        <p:txBody>
+          <a:bodyPr wrap="none">
+            <a:spAutoFit/>
+          </a:bodyPr>
+          <a:lstStyle/>
+          <a:p>
+            <a:r>
+              <a:rPr lang="en-CL" dirty="0"/>
+              <a:t>100.000 </a:t>
+            </a:r>
+            <a:endParaRPr lang="en-US" dirty="0"/>
+          </a:p>
+        </p:txBody>
+      </p:sp>
+      <p:cxnSp>
+        <p:nvCxnSpPr>
+          <p:cNvPr id="27" name="Straight Connector 26">
+            <a:extLst>
+              <a:ext uri="{FF2B5EF4-FFF2-40B4-BE49-F238E27FC236}">
+                <a16:creationId xmlns:a16="http://schemas.microsoft.com/office/drawing/2014/main" id="{8C55A3DC-2C66-E240-80FC-05EC38D114FD}"/>
+              </a:ext>
+            </a:extLst>
+          </p:cNvPr>
+          <p:cNvCxnSpPr>
+            <a:cxnSpLocks/>
+          </p:cNvCxnSpPr>
+          <p:nvPr/>
+        </p:nvCxnSpPr>
+        <p:spPr>
+          <a:xfrm>
+            <a:off x="3858049" y="5753954"/>
+            <a:ext cx="850332" cy="0"/>
+          </a:xfrm>
+          <a:prstGeom prst="line">
+            <a:avLst/>
+          </a:prstGeom>
+        </p:spPr>
+        <p:style>
+          <a:lnRef idx="1">
+            <a:schemeClr val="accent1"/>
+          </a:lnRef>
+          <a:fillRef idx="0">
+            <a:schemeClr val="accent1"/>
+          </a:fillRef>
+          <a:effectRef idx="0">
+            <a:schemeClr val="accent1"/>
+          </a:effectRef>
+          <a:fontRef idx="minor">
+            <a:schemeClr val="tx1"/>
+          </a:fontRef>
+        </p:style>
+      </p:cxnSp>
+      <p:sp>
+        <p:nvSpPr>
+          <p:cNvPr id="28" name="Rectangle 27">
+            <a:extLst>
+              <a:ext uri="{FF2B5EF4-FFF2-40B4-BE49-F238E27FC236}">
+                <a16:creationId xmlns:a16="http://schemas.microsoft.com/office/drawing/2014/main" id="{B5FACB19-1A2F-4D44-88E6-6A8B2CBFE1B9}"/>
+              </a:ext>
+            </a:extLst>
+          </p:cNvPr>
+          <p:cNvSpPr/>
+          <p:nvPr/>
+        </p:nvSpPr>
+        <p:spPr>
+          <a:xfrm>
+            <a:off x="3634323" y="5783958"/>
+            <a:ext cx="1236236" cy="369332"/>
+          </a:xfrm>
+          <a:prstGeom prst="rect">
+            <a:avLst/>
+          </a:prstGeom>
+        </p:spPr>
+        <p:txBody>
+          <a:bodyPr wrap="none">
+            <a:spAutoFit/>
+          </a:bodyPr>
+          <a:lstStyle/>
+          <a:p>
+            <a:r>
+              <a:rPr lang="en-CL" dirty="0"/>
+              <a:t>19.828.563</a:t>
+            </a:r>
+            <a:endParaRPr lang="en-US" dirty="0"/>
+          </a:p>
+        </p:txBody>
+      </p:sp>
+      <p:sp>
+        <p:nvSpPr>
+          <p:cNvPr id="29" name="Rectangle 28">
+            <a:extLst>
+              <a:ext uri="{FF2B5EF4-FFF2-40B4-BE49-F238E27FC236}">
+                <a16:creationId xmlns:a16="http://schemas.microsoft.com/office/drawing/2014/main" id="{D6F811AE-F4DF-9843-BDC8-422F084EBE81}"/>
+              </a:ext>
+            </a:extLst>
+          </p:cNvPr>
+          <p:cNvSpPr/>
+          <p:nvPr/>
+        </p:nvSpPr>
+        <p:spPr>
+          <a:xfrm>
+            <a:off x="4785280" y="5563266"/>
+            <a:ext cx="352982" cy="369332"/>
+          </a:xfrm>
+          <a:prstGeom prst="rect">
+            <a:avLst/>
+          </a:prstGeom>
+        </p:spPr>
+        <p:txBody>
+          <a:bodyPr wrap="none">
+            <a:spAutoFit/>
+          </a:bodyPr>
+          <a:lstStyle/>
+          <a:p>
+            <a:r>
+              <a:rPr lang="en-CL" dirty="0"/>
+              <a:t>= </a:t>
+            </a:r>
+            <a:endParaRPr lang="en-US" dirty="0"/>
+          </a:p>
+        </p:txBody>
+      </p:sp>
+      <p:sp>
+        <p:nvSpPr>
+          <p:cNvPr id="30" name="TextBox 29">
+            <a:extLst>
+              <a:ext uri="{FF2B5EF4-FFF2-40B4-BE49-F238E27FC236}">
+                <a16:creationId xmlns:a16="http://schemas.microsoft.com/office/drawing/2014/main" id="{F4224E87-AB99-2846-8F90-7FAE1CEF9EF0}"/>
+              </a:ext>
+            </a:extLst>
+          </p:cNvPr>
+          <p:cNvSpPr txBox="1"/>
+          <p:nvPr/>
+        </p:nvSpPr>
+        <p:spPr>
+          <a:xfrm>
+            <a:off x="5057370" y="5537591"/>
+            <a:ext cx="710451" cy="369332"/>
+          </a:xfrm>
+          <a:prstGeom prst="rect">
+            <a:avLst/>
+          </a:prstGeom>
+          <a:noFill/>
+        </p:spPr>
+        <p:txBody>
+          <a:bodyPr wrap="none" rtlCol="0">
+            <a:spAutoFit/>
+          </a:bodyPr>
+          <a:lstStyle/>
+          <a:p>
+            <a:r>
+              <a:rPr lang="en-US" dirty="0"/>
+              <a:t>170,3</a:t>
+            </a:r>
+          </a:p>
+        </p:txBody>
+      </p:sp>
+      <p:sp>
+        <p:nvSpPr>
+          <p:cNvPr id="31" name="TextBox 30">
+            <a:extLst>
+              <a:ext uri="{FF2B5EF4-FFF2-40B4-BE49-F238E27FC236}">
+                <a16:creationId xmlns:a16="http://schemas.microsoft.com/office/drawing/2014/main" id="{45EF222D-3660-0248-8E68-D8901705232C}"/>
+              </a:ext>
+            </a:extLst>
+          </p:cNvPr>
+          <p:cNvSpPr txBox="1"/>
+          <p:nvPr/>
+        </p:nvSpPr>
+        <p:spPr>
+          <a:xfrm>
+            <a:off x="210708" y="5122092"/>
+            <a:ext cx="1878849" cy="1200329"/>
+          </a:xfrm>
+          <a:prstGeom prst="rect">
+            <a:avLst/>
+          </a:prstGeom>
+          <a:noFill/>
+        </p:spPr>
+        <p:txBody>
+          <a:bodyPr wrap="none" rtlCol="0">
+            <a:spAutoFit/>
+          </a:bodyPr>
+          <a:lstStyle/>
+          <a:p>
+            <a:pPr algn="ctr"/>
+            <a:r>
+              <a:rPr lang="en-US" sz="2400" b="1" dirty="0" err="1">
+                <a:solidFill>
+                  <a:srgbClr val="FE0102"/>
+                </a:solidFill>
+              </a:rPr>
+              <a:t>Incidencia</a:t>
+            </a:r>
+            <a:r>
+              <a:rPr lang="en-US" sz="2400" b="1" dirty="0">
+                <a:solidFill>
+                  <a:srgbClr val="FE0102"/>
+                </a:solidFill>
+              </a:rPr>
+              <a:t> </a:t>
+            </a:r>
+          </a:p>
+          <a:p>
+            <a:pPr algn="ctr"/>
+            <a:r>
+              <a:rPr lang="en-US" sz="2400" b="1" dirty="0" err="1">
+                <a:solidFill>
+                  <a:srgbClr val="FE0102"/>
+                </a:solidFill>
+              </a:rPr>
+              <a:t>casos</a:t>
+            </a:r>
+            <a:r>
+              <a:rPr lang="en-US" sz="2400" b="1" dirty="0">
+                <a:solidFill>
+                  <a:srgbClr val="FE0102"/>
+                </a:solidFill>
+              </a:rPr>
+              <a:t> </a:t>
+            </a:r>
+            <a:r>
+              <a:rPr lang="en-US" sz="2400" b="1" dirty="0" err="1">
+                <a:solidFill>
+                  <a:srgbClr val="FE0102"/>
+                </a:solidFill>
+              </a:rPr>
+              <a:t>diarios</a:t>
+            </a:r>
+            <a:r>
+              <a:rPr lang="en-US" sz="2400" b="1" dirty="0">
+                <a:solidFill>
+                  <a:srgbClr val="FE0102"/>
+                </a:solidFill>
+              </a:rPr>
+              <a:t> </a:t>
+            </a:r>
+          </a:p>
+          <a:p>
+            <a:pPr algn="ctr"/>
+            <a:r>
+              <a:rPr lang="en-US" sz="2400" b="1" dirty="0">
+                <a:solidFill>
+                  <a:srgbClr val="FE0102"/>
+                </a:solidFill>
+              </a:rPr>
+              <a:t>x 100 mil</a:t>
+            </a:r>
+          </a:p>
+        </p:txBody>
+      </p:sp>
     </p:spTree>
     <p:extLst>
       <p:ext uri="{BB962C8B-B14F-4D97-AF65-F5344CB8AC3E}">
-        <p14:creationId xmlns:p14="http://schemas.microsoft.com/office/powerpoint/2010/main" val="2803636919"/>
+        <p14:creationId xmlns:p14="http://schemas.microsoft.com/office/powerpoint/2010/main" val="615004418"/>
       </p:ext>
     </p:extLst>
   </p:cSld>
@@ -5232,8 +6229,8 @@
         </p:nvSpPr>
         <p:spPr>
           <a:xfrm>
-            <a:off x="188534" y="128200"/>
-            <a:ext cx="6068989" cy="1323439"/>
+            <a:off x="2627010" y="128200"/>
+            <a:ext cx="6937980" cy="584775"/>
           </a:xfrm>
           <a:prstGeom prst="rect">
             <a:avLst/>
@@ -5251,102 +6248,17 @@
             <a:pPr algn="ctr"/>
             <a:r>
               <a:rPr lang="en-US" sz="3200" dirty="0"/>
-              <a:t>INCIDENCIA </a:t>
-            </a:r>
-          </a:p>
-          <a:p>
-            <a:pPr algn="ctr"/>
-            <a:r>
-              <a:rPr lang="en-US" sz="2400" dirty="0" err="1"/>
-              <a:t>Promedio</a:t>
-            </a:r>
-            <a:r>
-              <a:rPr lang="en-US" sz="2400" dirty="0"/>
-              <a:t> </a:t>
-            </a:r>
-            <a:r>
-              <a:rPr lang="en-US" sz="2400" dirty="0" err="1"/>
-              <a:t>casos</a:t>
-            </a:r>
-            <a:r>
-              <a:rPr lang="en-US" sz="2400" dirty="0"/>
-              <a:t> </a:t>
-            </a:r>
-            <a:r>
-              <a:rPr lang="en-US" sz="2400" dirty="0" err="1"/>
-              <a:t>confirmados</a:t>
-            </a:r>
-            <a:r>
-              <a:rPr lang="en-US" sz="2400" dirty="0"/>
-              <a:t> </a:t>
-            </a:r>
-            <a:r>
-              <a:rPr lang="en-US" sz="2400" dirty="0" err="1"/>
-              <a:t>diarios</a:t>
-            </a:r>
-            <a:r>
-              <a:rPr lang="en-US" sz="2400" dirty="0"/>
-              <a:t> </a:t>
-            </a:r>
-          </a:p>
-          <a:p>
-            <a:pPr algn="ctr"/>
-            <a:r>
-              <a:rPr lang="en-US" sz="2400" dirty="0"/>
-              <a:t>x 100 mil </a:t>
-            </a:r>
-            <a:r>
-              <a:rPr lang="en-US" sz="2400" dirty="0" err="1"/>
-              <a:t>habitantes</a:t>
-            </a:r>
-            <a:endParaRPr lang="en-US" sz="2400" dirty="0"/>
-          </a:p>
-        </p:txBody>
-      </p:sp>
-      <p:sp>
-        <p:nvSpPr>
-          <p:cNvPr id="11" name="TextBox 10">
-            <a:extLst>
-              <a:ext uri="{FF2B5EF4-FFF2-40B4-BE49-F238E27FC236}">
-                <a16:creationId xmlns:a16="http://schemas.microsoft.com/office/drawing/2014/main" id="{0AA3CF90-3BBE-F041-B74C-D680E845FFBE}"/>
-              </a:ext>
-            </a:extLst>
-          </p:cNvPr>
-          <p:cNvSpPr txBox="1"/>
-          <p:nvPr/>
-        </p:nvSpPr>
-        <p:spPr>
-          <a:xfrm>
-            <a:off x="6257523" y="128200"/>
-            <a:ext cx="5785995" cy="584775"/>
-          </a:xfrm>
-          <a:prstGeom prst="rect">
-            <a:avLst/>
-          </a:prstGeom>
-          <a:solidFill>
-            <a:schemeClr val="bg1"/>
-          </a:solidFill>
-        </p:spPr>
-        <p:txBody>
-          <a:bodyPr wrap="square" rtlCol="0">
-            <a:spAutoFit/>
-          </a:bodyPr>
-          <a:lstStyle/>
-          <a:p>
-            <a:pPr algn="ctr"/>
-            <a:r>
-              <a:rPr lang="en-US" sz="3200" dirty="0"/>
-              <a:t>TESTS PCR SEMANALES </a:t>
+              <a:t>CASOS CONFIRMADOS POR SEMANA </a:t>
             </a:r>
           </a:p>
         </p:txBody>
       </p:sp>
       <p:pic>
         <p:nvPicPr>
-          <p:cNvPr id="4" name="Picture 3">
-            <a:extLst>
-              <a:ext uri="{FF2B5EF4-FFF2-40B4-BE49-F238E27FC236}">
-                <a16:creationId xmlns:a16="http://schemas.microsoft.com/office/drawing/2014/main" id="{92892BBD-D91C-C540-AC62-A65B3A57BDE2}"/>
+          <p:cNvPr id="2" name="Picture 1">
+            <a:extLst>
+              <a:ext uri="{FF2B5EF4-FFF2-40B4-BE49-F238E27FC236}">
+                <a16:creationId xmlns:a16="http://schemas.microsoft.com/office/drawing/2014/main" id="{38804368-A689-054B-8049-9AC162781A5D}"/>
               </a:ext>
             </a:extLst>
           </p:cNvPr>
@@ -5363,38 +6275,8 @@
         </p:blipFill>
         <p:spPr>
           <a:xfrm>
-            <a:off x="188534" y="1482364"/>
-            <a:ext cx="5931462" cy="4438711"/>
-          </a:xfrm>
-          <a:prstGeom prst="rect">
-            <a:avLst/>
-          </a:prstGeom>
-        </p:spPr>
-      </p:pic>
-      <p:pic>
-        <p:nvPicPr>
-          <p:cNvPr id="5" name="Picture 4">
-            <a:extLst>
-              <a:ext uri="{FF2B5EF4-FFF2-40B4-BE49-F238E27FC236}">
-                <a16:creationId xmlns:a16="http://schemas.microsoft.com/office/drawing/2014/main" id="{4C98992B-425D-EA4A-B598-FCFC6582DAE9}"/>
-              </a:ext>
-            </a:extLst>
-          </p:cNvPr>
-          <p:cNvPicPr>
-            <a:picLocks noChangeAspect="1"/>
-          </p:cNvPicPr>
-          <p:nvPr/>
-        </p:nvPicPr>
-        <p:blipFill>
-          <a:blip r:embed="rId4"/>
-          <a:stretch>
-            <a:fillRect/>
-          </a:stretch>
-        </p:blipFill>
-        <p:spPr>
-          <a:xfrm>
-            <a:off x="6207220" y="1482363"/>
-            <a:ext cx="5984780" cy="4438712"/>
+            <a:off x="2197100" y="590550"/>
+            <a:ext cx="7797800" cy="5676900"/>
           </a:xfrm>
           <a:prstGeom prst="rect">
             <a:avLst/>
@@ -5404,7 +6286,7 @@
     </p:spTree>
     <p:extLst>
       <p:ext uri="{BB962C8B-B14F-4D97-AF65-F5344CB8AC3E}">
-        <p14:creationId xmlns:p14="http://schemas.microsoft.com/office/powerpoint/2010/main" val="2245086434"/>
+        <p14:creationId xmlns:p14="http://schemas.microsoft.com/office/powerpoint/2010/main" val="2803636919"/>
       </p:ext>
     </p:extLst>
   </p:cSld>
@@ -5433,10 +6315,10 @@
       </p:grpSpPr>
       <p:sp>
         <p:nvSpPr>
-          <p:cNvPr id="4" name="TextBox 3">
-            <a:extLst>
-              <a:ext uri="{FF2B5EF4-FFF2-40B4-BE49-F238E27FC236}">
-                <a16:creationId xmlns:a16="http://schemas.microsoft.com/office/drawing/2014/main" id="{5BCAFE7A-E299-D14E-9413-EB5C984AF441}"/>
+          <p:cNvPr id="6" name="TextBox 5">
+            <a:extLst>
+              <a:ext uri="{FF2B5EF4-FFF2-40B4-BE49-F238E27FC236}">
+                <a16:creationId xmlns:a16="http://schemas.microsoft.com/office/drawing/2014/main" id="{AB65407A-4582-004A-A45F-BD87B99ABAF2}"/>
               </a:ext>
             </a:extLst>
           </p:cNvPr>
@@ -5445,56 +6327,178 @@
         </p:nvSpPr>
         <p:spPr>
           <a:xfrm>
-            <a:off x="3621059" y="2846895"/>
-            <a:ext cx="4219360" cy="1015663"/>
+            <a:off x="188534" y="128200"/>
+            <a:ext cx="6068989" cy="1323439"/>
           </a:xfrm>
           <a:prstGeom prst="rect">
             <a:avLst/>
           </a:prstGeom>
-          <a:noFill/>
-        </p:spPr>
-        <p:txBody>
-          <a:bodyPr wrap="none" rtlCol="0">
+          <a:solidFill>
+            <a:schemeClr val="bg1"/>
+          </a:solidFill>
+        </p:spPr>
+        <p:txBody>
+          <a:bodyPr wrap="square" rtlCol="0">
             <a:spAutoFit/>
           </a:bodyPr>
           <a:lstStyle/>
           <a:p>
-            <a:r>
-              <a:rPr lang="en-US" sz="6000" dirty="0"/>
-              <a:t>POSITIVIDAD</a:t>
-            </a:r>
-          </a:p>
-        </p:txBody>
-      </p:sp>
-      <p:sp>
-        <p:nvSpPr>
-          <p:cNvPr id="5" name="Title 4">
-            <a:extLst>
-              <a:ext uri="{FF2B5EF4-FFF2-40B4-BE49-F238E27FC236}">
-                <a16:creationId xmlns:a16="http://schemas.microsoft.com/office/drawing/2014/main" id="{5B465201-ED47-B64A-B505-4DDA25649C32}"/>
-              </a:ext>
-            </a:extLst>
-          </p:cNvPr>
-          <p:cNvSpPr>
-            <a:spLocks noGrp="1"/>
-          </p:cNvSpPr>
-          <p:nvPr>
-            <p:ph type="title"/>
-          </p:nvPr>
-        </p:nvSpPr>
-        <p:spPr/>
-        <p:txBody>
-          <a:bodyPr/>
-          <a:lstStyle/>
-          <a:p>
-            <a:endParaRPr lang="en-US"/>
-          </a:p>
-        </p:txBody>
-      </p:sp>
+            <a:pPr algn="ctr"/>
+            <a:r>
+              <a:rPr lang="en-US" sz="3200" dirty="0"/>
+              <a:t>INCIDENCIA </a:t>
+            </a:r>
+          </a:p>
+          <a:p>
+            <a:pPr algn="ctr"/>
+            <a:r>
+              <a:rPr lang="en-US" sz="2400" dirty="0" err="1"/>
+              <a:t>Promedio</a:t>
+            </a:r>
+            <a:r>
+              <a:rPr lang="en-US" sz="2400" dirty="0"/>
+              <a:t> </a:t>
+            </a:r>
+            <a:r>
+              <a:rPr lang="en-US" sz="2400" dirty="0" err="1"/>
+              <a:t>casos</a:t>
+            </a:r>
+            <a:r>
+              <a:rPr lang="en-US" sz="2400" dirty="0"/>
+              <a:t> </a:t>
+            </a:r>
+            <a:r>
+              <a:rPr lang="en-US" sz="2400" dirty="0" err="1"/>
+              <a:t>confirmados</a:t>
+            </a:r>
+            <a:r>
+              <a:rPr lang="en-US" sz="2400" dirty="0"/>
+              <a:t> </a:t>
+            </a:r>
+            <a:r>
+              <a:rPr lang="en-US" sz="2400" dirty="0" err="1"/>
+              <a:t>diarios</a:t>
+            </a:r>
+            <a:r>
+              <a:rPr lang="en-US" sz="2400" dirty="0"/>
+              <a:t> </a:t>
+            </a:r>
+          </a:p>
+          <a:p>
+            <a:pPr algn="ctr"/>
+            <a:r>
+              <a:rPr lang="en-US" sz="2400" dirty="0"/>
+              <a:t>x 100 mil </a:t>
+            </a:r>
+            <a:r>
+              <a:rPr lang="en-US" sz="2400" dirty="0" err="1"/>
+              <a:t>habitantes</a:t>
+            </a:r>
+            <a:endParaRPr lang="en-US" sz="2400" dirty="0"/>
+          </a:p>
+        </p:txBody>
+      </p:sp>
+      <p:sp>
+        <p:nvSpPr>
+          <p:cNvPr id="11" name="TextBox 10">
+            <a:extLst>
+              <a:ext uri="{FF2B5EF4-FFF2-40B4-BE49-F238E27FC236}">
+                <a16:creationId xmlns:a16="http://schemas.microsoft.com/office/drawing/2014/main" id="{0AA3CF90-3BBE-F041-B74C-D680E845FFBE}"/>
+              </a:ext>
+            </a:extLst>
+          </p:cNvPr>
+          <p:cNvSpPr txBox="1"/>
+          <p:nvPr/>
+        </p:nvSpPr>
+        <p:spPr>
+          <a:xfrm>
+            <a:off x="6257523" y="128200"/>
+            <a:ext cx="5785995" cy="584775"/>
+          </a:xfrm>
+          <a:prstGeom prst="rect">
+            <a:avLst/>
+          </a:prstGeom>
+          <a:solidFill>
+            <a:schemeClr val="bg1"/>
+          </a:solidFill>
+        </p:spPr>
+        <p:txBody>
+          <a:bodyPr wrap="square" rtlCol="0">
+            <a:spAutoFit/>
+          </a:bodyPr>
+          <a:lstStyle/>
+          <a:p>
+            <a:pPr algn="ctr"/>
+            <a:r>
+              <a:rPr lang="en-US" sz="3200" dirty="0"/>
+              <a:t>TESTS PCR SEMANALES </a:t>
+            </a:r>
+          </a:p>
+        </p:txBody>
+      </p:sp>
+      <p:pic>
+        <p:nvPicPr>
+          <p:cNvPr id="5" name="Picture 4">
+            <a:extLst>
+              <a:ext uri="{FF2B5EF4-FFF2-40B4-BE49-F238E27FC236}">
+                <a16:creationId xmlns:a16="http://schemas.microsoft.com/office/drawing/2014/main" id="{4C98992B-425D-EA4A-B598-FCFC6582DAE9}"/>
+              </a:ext>
+            </a:extLst>
+          </p:cNvPr>
+          <p:cNvPicPr>
+            <a:picLocks noChangeAspect="1"/>
+          </p:cNvPicPr>
+          <p:nvPr/>
+        </p:nvPicPr>
+        <p:blipFill>
+          <a:blip r:embed="rId3"/>
+          <a:stretch>
+            <a:fillRect/>
+          </a:stretch>
+        </p:blipFill>
+        <p:spPr>
+          <a:xfrm>
+            <a:off x="6207220" y="1482363"/>
+            <a:ext cx="5984780" cy="4438712"/>
+          </a:xfrm>
+          <a:prstGeom prst="rect">
+            <a:avLst/>
+          </a:prstGeom>
+        </p:spPr>
+      </p:pic>
+      <p:pic>
+        <p:nvPicPr>
+          <p:cNvPr id="7" name="Picture 6">
+            <a:extLst>
+              <a:ext uri="{FF2B5EF4-FFF2-40B4-BE49-F238E27FC236}">
+                <a16:creationId xmlns:a16="http://schemas.microsoft.com/office/drawing/2014/main" id="{1ACBAA0D-AB89-F645-951E-7E9D5AB69103}"/>
+              </a:ext>
+            </a:extLst>
+          </p:cNvPr>
+          <p:cNvPicPr>
+            <a:picLocks noChangeAspect="1"/>
+          </p:cNvPicPr>
+          <p:nvPr/>
+        </p:nvPicPr>
+        <p:blipFill rotWithShape="1">
+          <a:blip r:embed="rId4"/>
+          <a:srcRect t="1893"/>
+          <a:stretch/>
+        </p:blipFill>
+        <p:spPr>
+          <a:xfrm>
+            <a:off x="66866" y="1482364"/>
+            <a:ext cx="6029134" cy="4438711"/>
+          </a:xfrm>
+          <a:prstGeom prst="rect">
+            <a:avLst/>
+          </a:prstGeom>
+        </p:spPr>
+      </p:pic>
     </p:spTree>
     <p:extLst>
       <p:ext uri="{BB962C8B-B14F-4D97-AF65-F5344CB8AC3E}">
-        <p14:creationId xmlns:p14="http://schemas.microsoft.com/office/powerpoint/2010/main" val="4150063257"/>
+        <p14:creationId xmlns:p14="http://schemas.microsoft.com/office/powerpoint/2010/main" val="2245086434"/>
       </p:ext>
     </p:extLst>
   </p:cSld>
@@ -5523,10 +6527,10 @@
       </p:grpSpPr>
       <p:sp>
         <p:nvSpPr>
-          <p:cNvPr id="6" name="TextBox 5">
-            <a:extLst>
-              <a:ext uri="{FF2B5EF4-FFF2-40B4-BE49-F238E27FC236}">
-                <a16:creationId xmlns:a16="http://schemas.microsoft.com/office/drawing/2014/main" id="{AB65407A-4582-004A-A45F-BD87B99ABAF2}"/>
+          <p:cNvPr id="4" name="TextBox 3">
+            <a:extLst>
+              <a:ext uri="{FF2B5EF4-FFF2-40B4-BE49-F238E27FC236}">
+                <a16:creationId xmlns:a16="http://schemas.microsoft.com/office/drawing/2014/main" id="{5BCAFE7A-E299-D14E-9413-EB5C984AF441}"/>
               </a:ext>
             </a:extLst>
           </p:cNvPr>
@@ -5535,15 +6539,13 @@
         </p:nvSpPr>
         <p:spPr>
           <a:xfrm>
-            <a:off x="2600918" y="0"/>
-            <a:ext cx="7564828" cy="584775"/>
+            <a:off x="3621059" y="2846895"/>
+            <a:ext cx="4219360" cy="1015663"/>
           </a:xfrm>
           <a:prstGeom prst="rect">
             <a:avLst/>
           </a:prstGeom>
-          <a:solidFill>
-            <a:schemeClr val="bg1"/>
-          </a:solidFill>
+          <a:noFill/>
         </p:spPr>
         <p:txBody>
           <a:bodyPr wrap="none" rtlCol="0">
@@ -5552,46 +6554,41 @@
           <a:lstStyle/>
           <a:p>
             <a:r>
-              <a:rPr lang="en-US" sz="3200" dirty="0"/>
-              <a:t>POSITIVIDAD SEMANAL EN CHILE (TEST PCR)</a:t>
-            </a:r>
-          </a:p>
-        </p:txBody>
-      </p:sp>
-      <p:pic>
-        <p:nvPicPr>
-          <p:cNvPr id="3" name="Picture 2">
-            <a:extLst>
-              <a:ext uri="{FF2B5EF4-FFF2-40B4-BE49-F238E27FC236}">
-                <a16:creationId xmlns:a16="http://schemas.microsoft.com/office/drawing/2014/main" id="{79D1939A-6F90-8D47-B96A-0378C4E9A635}"/>
-              </a:ext>
-            </a:extLst>
-          </p:cNvPr>
-          <p:cNvPicPr>
-            <a:picLocks noChangeAspect="1"/>
-          </p:cNvPicPr>
-          <p:nvPr/>
-        </p:nvPicPr>
-        <p:blipFill>
-          <a:blip r:embed="rId3"/>
-          <a:stretch>
-            <a:fillRect/>
-          </a:stretch>
-        </p:blipFill>
-        <p:spPr>
-          <a:xfrm>
-            <a:off x="2311400" y="577850"/>
-            <a:ext cx="7569200" cy="5702300"/>
-          </a:xfrm>
-          <a:prstGeom prst="rect">
-            <a:avLst/>
-          </a:prstGeom>
-        </p:spPr>
-      </p:pic>
+              <a:rPr lang="en-US" sz="6000" dirty="0"/>
+              <a:t>POSITIVIDAD</a:t>
+            </a:r>
+          </a:p>
+        </p:txBody>
+      </p:sp>
+      <p:sp>
+        <p:nvSpPr>
+          <p:cNvPr id="5" name="Title 4">
+            <a:extLst>
+              <a:ext uri="{FF2B5EF4-FFF2-40B4-BE49-F238E27FC236}">
+                <a16:creationId xmlns:a16="http://schemas.microsoft.com/office/drawing/2014/main" id="{5B465201-ED47-B64A-B505-4DDA25649C32}"/>
+              </a:ext>
+            </a:extLst>
+          </p:cNvPr>
+          <p:cNvSpPr>
+            <a:spLocks noGrp="1"/>
+          </p:cNvSpPr>
+          <p:nvPr>
+            <p:ph type="title"/>
+          </p:nvPr>
+        </p:nvSpPr>
+        <p:spPr/>
+        <p:txBody>
+          <a:bodyPr/>
+          <a:lstStyle/>
+          <a:p>
+            <a:endParaRPr lang="en-US"/>
+          </a:p>
+        </p:txBody>
+      </p:sp>
     </p:spTree>
     <p:extLst>
       <p:ext uri="{BB962C8B-B14F-4D97-AF65-F5344CB8AC3E}">
-        <p14:creationId xmlns:p14="http://schemas.microsoft.com/office/powerpoint/2010/main" val="53311632"/>
+        <p14:creationId xmlns:p14="http://schemas.microsoft.com/office/powerpoint/2010/main" val="4150063257"/>
       </p:ext>
     </p:extLst>
   </p:cSld>
@@ -5632,8 +6629,8 @@
         </p:nvSpPr>
         <p:spPr>
           <a:xfrm>
-            <a:off x="4296885" y="0"/>
-            <a:ext cx="3598229" cy="584775"/>
+            <a:off x="2600918" y="0"/>
+            <a:ext cx="7564828" cy="584775"/>
           </a:xfrm>
           <a:prstGeom prst="rect">
             <a:avLst/>
@@ -5650,77 +6647,7 @@
           <a:p>
             <a:r>
               <a:rPr lang="en-US" sz="3200" dirty="0"/>
-              <a:t>TESTS DE ANTÍGENO</a:t>
-            </a:r>
-          </a:p>
-        </p:txBody>
-      </p:sp>
-      <p:sp>
-        <p:nvSpPr>
-          <p:cNvPr id="4" name="TextBox 3">
-            <a:extLst>
-              <a:ext uri="{FF2B5EF4-FFF2-40B4-BE49-F238E27FC236}">
-                <a16:creationId xmlns:a16="http://schemas.microsoft.com/office/drawing/2014/main" id="{BDA1CD53-580B-B247-B344-C638ED4B5016}"/>
-              </a:ext>
-            </a:extLst>
-          </p:cNvPr>
-          <p:cNvSpPr txBox="1"/>
-          <p:nvPr/>
-        </p:nvSpPr>
-        <p:spPr>
-          <a:xfrm>
-            <a:off x="1813322" y="939060"/>
-            <a:ext cx="2509020" cy="461665"/>
-          </a:xfrm>
-          <a:prstGeom prst="rect">
-            <a:avLst/>
-          </a:prstGeom>
-          <a:noFill/>
-        </p:spPr>
-        <p:txBody>
-          <a:bodyPr wrap="none" rtlCol="0">
-            <a:spAutoFit/>
-          </a:bodyPr>
-          <a:lstStyle/>
-          <a:p>
-            <a:r>
-              <a:rPr lang="en-CL" sz="2400" dirty="0"/>
-              <a:t>TESTS SEMANALES</a:t>
-            </a:r>
-          </a:p>
-        </p:txBody>
-      </p:sp>
-      <p:sp>
-        <p:nvSpPr>
-          <p:cNvPr id="9" name="TextBox 8">
-            <a:extLst>
-              <a:ext uri="{FF2B5EF4-FFF2-40B4-BE49-F238E27FC236}">
-                <a16:creationId xmlns:a16="http://schemas.microsoft.com/office/drawing/2014/main" id="{16CA662A-1C2E-FA46-9D88-094DDB686220}"/>
-              </a:ext>
-            </a:extLst>
-          </p:cNvPr>
-          <p:cNvSpPr txBox="1"/>
-          <p:nvPr/>
-        </p:nvSpPr>
-        <p:spPr>
-          <a:xfrm>
-            <a:off x="7387145" y="932824"/>
-            <a:ext cx="3104055" cy="461665"/>
-          </a:xfrm>
-          <a:prstGeom prst="rect">
-            <a:avLst/>
-          </a:prstGeom>
-          <a:noFill/>
-        </p:spPr>
-        <p:txBody>
-          <a:bodyPr wrap="none" rtlCol="0">
-            <a:spAutoFit/>
-          </a:bodyPr>
-          <a:lstStyle/>
-          <a:p>
-            <a:r>
-              <a:rPr lang="en-CL" sz="2400" dirty="0"/>
-              <a:t>POSITIVIDAD SEMANAL</a:t>
+              <a:t>POSITIVIDAD SEMANAL EN CHILE (TEST PCR)</a:t>
             </a:r>
           </a:p>
         </p:txBody>
@@ -5730,7 +6657,7 @@
           <p:cNvPr id="3" name="Picture 2">
             <a:extLst>
               <a:ext uri="{FF2B5EF4-FFF2-40B4-BE49-F238E27FC236}">
-                <a16:creationId xmlns:a16="http://schemas.microsoft.com/office/drawing/2014/main" id="{5263D743-4E6D-6A4D-AA7F-473C398DBE2F}"/>
+                <a16:creationId xmlns:a16="http://schemas.microsoft.com/office/drawing/2014/main" id="{79D1939A-6F90-8D47-B96A-0378C4E9A635}"/>
               </a:ext>
             </a:extLst>
           </p:cNvPr>
@@ -5747,38 +6674,8 @@
         </p:blipFill>
         <p:spPr>
           <a:xfrm>
-            <a:off x="102382" y="1717744"/>
-            <a:ext cx="5859605" cy="4360408"/>
-          </a:xfrm>
-          <a:prstGeom prst="rect">
-            <a:avLst/>
-          </a:prstGeom>
-        </p:spPr>
-      </p:pic>
-      <p:pic>
-        <p:nvPicPr>
-          <p:cNvPr id="7" name="Picture 6">
-            <a:extLst>
-              <a:ext uri="{FF2B5EF4-FFF2-40B4-BE49-F238E27FC236}">
-                <a16:creationId xmlns:a16="http://schemas.microsoft.com/office/drawing/2014/main" id="{A9807701-CE86-5E4F-A45F-4B24B9D15D59}"/>
-              </a:ext>
-            </a:extLst>
-          </p:cNvPr>
-          <p:cNvPicPr>
-            <a:picLocks noChangeAspect="1"/>
-          </p:cNvPicPr>
-          <p:nvPr/>
-        </p:nvPicPr>
-        <p:blipFill>
-          <a:blip r:embed="rId4"/>
-          <a:stretch>
-            <a:fillRect/>
-          </a:stretch>
-        </p:blipFill>
-        <p:spPr>
-          <a:xfrm>
-            <a:off x="5961987" y="1717744"/>
-            <a:ext cx="6127631" cy="4512440"/>
+            <a:off x="2311400" y="577850"/>
+            <a:ext cx="7569200" cy="5702300"/>
           </a:xfrm>
           <a:prstGeom prst="rect">
             <a:avLst/>
@@ -5788,7 +6685,7 @@
     </p:spTree>
     <p:extLst>
       <p:ext uri="{BB962C8B-B14F-4D97-AF65-F5344CB8AC3E}">
-        <p14:creationId xmlns:p14="http://schemas.microsoft.com/office/powerpoint/2010/main" val="2356623230"/>
+        <p14:creationId xmlns:p14="http://schemas.microsoft.com/office/powerpoint/2010/main" val="53311632"/>
       </p:ext>
     </p:extLst>
   </p:cSld>
@@ -5817,10 +6714,10 @@
       </p:grpSpPr>
       <p:sp>
         <p:nvSpPr>
-          <p:cNvPr id="4" name="TextBox 3">
-            <a:extLst>
-              <a:ext uri="{FF2B5EF4-FFF2-40B4-BE49-F238E27FC236}">
-                <a16:creationId xmlns:a16="http://schemas.microsoft.com/office/drawing/2014/main" id="{5BCAFE7A-E299-D14E-9413-EB5C984AF441}"/>
+          <p:cNvPr id="6" name="TextBox 5">
+            <a:extLst>
+              <a:ext uri="{FF2B5EF4-FFF2-40B4-BE49-F238E27FC236}">
+                <a16:creationId xmlns:a16="http://schemas.microsoft.com/office/drawing/2014/main" id="{AB65407A-4582-004A-A45F-BD87B99ABAF2}"/>
               </a:ext>
             </a:extLst>
           </p:cNvPr>
@@ -5829,8 +6726,45 @@
         </p:nvSpPr>
         <p:spPr>
           <a:xfrm>
-            <a:off x="2570612" y="2790624"/>
-            <a:ext cx="7050776" cy="1015663"/>
+            <a:off x="4296885" y="0"/>
+            <a:ext cx="3598229" cy="584775"/>
+          </a:xfrm>
+          <a:prstGeom prst="rect">
+            <a:avLst/>
+          </a:prstGeom>
+          <a:solidFill>
+            <a:schemeClr val="bg1"/>
+          </a:solidFill>
+        </p:spPr>
+        <p:txBody>
+          <a:bodyPr wrap="none" rtlCol="0">
+            <a:spAutoFit/>
+          </a:bodyPr>
+          <a:lstStyle/>
+          <a:p>
+            <a:r>
+              <a:rPr lang="en-US" sz="3200" dirty="0"/>
+              <a:t>TESTS DE ANTÍGENO</a:t>
+            </a:r>
+          </a:p>
+        </p:txBody>
+      </p:sp>
+      <p:sp>
+        <p:nvSpPr>
+          <p:cNvPr id="4" name="TextBox 3">
+            <a:extLst>
+              <a:ext uri="{FF2B5EF4-FFF2-40B4-BE49-F238E27FC236}">
+                <a16:creationId xmlns:a16="http://schemas.microsoft.com/office/drawing/2014/main" id="{BDA1CD53-580B-B247-B344-C638ED4B5016}"/>
+              </a:ext>
+            </a:extLst>
+          </p:cNvPr>
+          <p:cNvSpPr txBox="1"/>
+          <p:nvPr/>
+        </p:nvSpPr>
+        <p:spPr>
+          <a:xfrm>
+            <a:off x="1813322" y="939060"/>
+            <a:ext cx="2509020" cy="461665"/>
           </a:xfrm>
           <a:prstGeom prst="rect">
             <a:avLst/>
@@ -5844,41 +6778,111 @@
           <a:lstStyle/>
           <a:p>
             <a:r>
-              <a:rPr lang="en-US" sz="6000" dirty="0"/>
-              <a:t>SITUACIÓN REGIONAL</a:t>
-            </a:r>
-          </a:p>
-        </p:txBody>
-      </p:sp>
-      <p:sp>
-        <p:nvSpPr>
-          <p:cNvPr id="5" name="Title 4">
-            <a:extLst>
-              <a:ext uri="{FF2B5EF4-FFF2-40B4-BE49-F238E27FC236}">
-                <a16:creationId xmlns:a16="http://schemas.microsoft.com/office/drawing/2014/main" id="{5B465201-ED47-B64A-B505-4DDA25649C32}"/>
-              </a:ext>
-            </a:extLst>
-          </p:cNvPr>
-          <p:cNvSpPr>
-            <a:spLocks noGrp="1"/>
-          </p:cNvSpPr>
-          <p:nvPr>
-            <p:ph type="title"/>
-          </p:nvPr>
-        </p:nvSpPr>
-        <p:spPr/>
-        <p:txBody>
-          <a:bodyPr/>
-          <a:lstStyle/>
-          <a:p>
-            <a:endParaRPr lang="en-US"/>
-          </a:p>
-        </p:txBody>
-      </p:sp>
+              <a:rPr lang="en-CL" sz="2400" dirty="0"/>
+              <a:t>TESTS SEMANALES</a:t>
+            </a:r>
+          </a:p>
+        </p:txBody>
+      </p:sp>
+      <p:sp>
+        <p:nvSpPr>
+          <p:cNvPr id="9" name="TextBox 8">
+            <a:extLst>
+              <a:ext uri="{FF2B5EF4-FFF2-40B4-BE49-F238E27FC236}">
+                <a16:creationId xmlns:a16="http://schemas.microsoft.com/office/drawing/2014/main" id="{16CA662A-1C2E-FA46-9D88-094DDB686220}"/>
+              </a:ext>
+            </a:extLst>
+          </p:cNvPr>
+          <p:cNvSpPr txBox="1"/>
+          <p:nvPr/>
+        </p:nvSpPr>
+        <p:spPr>
+          <a:xfrm>
+            <a:off x="7387145" y="932824"/>
+            <a:ext cx="3104055" cy="461665"/>
+          </a:xfrm>
+          <a:prstGeom prst="rect">
+            <a:avLst/>
+          </a:prstGeom>
+          <a:noFill/>
+        </p:spPr>
+        <p:txBody>
+          <a:bodyPr wrap="none" rtlCol="0">
+            <a:spAutoFit/>
+          </a:bodyPr>
+          <a:lstStyle/>
+          <a:p>
+            <a:r>
+              <a:rPr lang="en-CL" sz="2400" dirty="0"/>
+              <a:t>POSITIVIDAD SEMANAL</a:t>
+            </a:r>
+          </a:p>
+        </p:txBody>
+      </p:sp>
+      <p:pic>
+        <p:nvPicPr>
+          <p:cNvPr id="3" name="Picture 2">
+            <a:extLst>
+              <a:ext uri="{FF2B5EF4-FFF2-40B4-BE49-F238E27FC236}">
+                <a16:creationId xmlns:a16="http://schemas.microsoft.com/office/drawing/2014/main" id="{5263D743-4E6D-6A4D-AA7F-473C398DBE2F}"/>
+              </a:ext>
+            </a:extLst>
+          </p:cNvPr>
+          <p:cNvPicPr>
+            <a:picLocks noChangeAspect="1"/>
+          </p:cNvPicPr>
+          <p:nvPr/>
+        </p:nvPicPr>
+        <p:blipFill>
+          <a:blip r:embed="rId3"/>
+          <a:stretch>
+            <a:fillRect/>
+          </a:stretch>
+        </p:blipFill>
+        <p:spPr>
+          <a:xfrm>
+            <a:off x="102382" y="1717744"/>
+            <a:ext cx="5859605" cy="4360408"/>
+          </a:xfrm>
+          <a:prstGeom prst="rect">
+            <a:avLst/>
+          </a:prstGeom>
+        </p:spPr>
+      </p:pic>
+      <p:pic>
+        <p:nvPicPr>
+          <p:cNvPr id="7" name="Picture 6">
+            <a:extLst>
+              <a:ext uri="{FF2B5EF4-FFF2-40B4-BE49-F238E27FC236}">
+                <a16:creationId xmlns:a16="http://schemas.microsoft.com/office/drawing/2014/main" id="{A9807701-CE86-5E4F-A45F-4B24B9D15D59}"/>
+              </a:ext>
+            </a:extLst>
+          </p:cNvPr>
+          <p:cNvPicPr>
+            <a:picLocks noChangeAspect="1"/>
+          </p:cNvPicPr>
+          <p:nvPr/>
+        </p:nvPicPr>
+        <p:blipFill>
+          <a:blip r:embed="rId4"/>
+          <a:stretch>
+            <a:fillRect/>
+          </a:stretch>
+        </p:blipFill>
+        <p:spPr>
+          <a:xfrm>
+            <a:off x="5961987" y="1717744"/>
+            <a:ext cx="6127631" cy="4512440"/>
+          </a:xfrm>
+          <a:prstGeom prst="rect">
+            <a:avLst/>
+          </a:prstGeom>
+        </p:spPr>
+      </p:pic>
     </p:spTree>
     <p:extLst>
       <p:ext uri="{BB962C8B-B14F-4D97-AF65-F5344CB8AC3E}">
-        <p14:creationId xmlns:p14="http://schemas.microsoft.com/office/powerpoint/2010/main" val="3222710163"/>
+        <p14:creationId xmlns:p14="http://schemas.microsoft.com/office/powerpoint/2010/main" val="2356623230"/>
       </p:ext>
     </p:extLst>
   </p:cSld>
@@ -5907,10 +6911,10 @@
       </p:grpSpPr>
       <p:sp>
         <p:nvSpPr>
-          <p:cNvPr id="7" name="TextBox 6">
-            <a:extLst>
-              <a:ext uri="{FF2B5EF4-FFF2-40B4-BE49-F238E27FC236}">
-                <a16:creationId xmlns:a16="http://schemas.microsoft.com/office/drawing/2014/main" id="{55690B03-9D47-C14E-B04F-CDC54442A1B8}"/>
+          <p:cNvPr id="4" name="TextBox 3">
+            <a:extLst>
+              <a:ext uri="{FF2B5EF4-FFF2-40B4-BE49-F238E27FC236}">
+                <a16:creationId xmlns:a16="http://schemas.microsoft.com/office/drawing/2014/main" id="{5BCAFE7A-E299-D14E-9413-EB5C984AF441}"/>
               </a:ext>
             </a:extLst>
           </p:cNvPr>
@@ -5919,8 +6923,8 @@
         </p:nvSpPr>
         <p:spPr>
           <a:xfrm>
-            <a:off x="2738651" y="28135"/>
-            <a:ext cx="6714723" cy="584775"/>
+            <a:off x="2570612" y="2790624"/>
+            <a:ext cx="7050776" cy="1015663"/>
           </a:xfrm>
           <a:prstGeom prst="rect">
             <a:avLst/>
@@ -5933,161 +6937,42 @@
           </a:bodyPr>
           <a:lstStyle/>
           <a:p>
-            <a:pPr algn="ctr"/>
-            <a:r>
-              <a:rPr lang="en-US" sz="3200" dirty="0"/>
-              <a:t>NIVEL DE CONTAGIO – 19 </a:t>
-            </a:r>
-            <a:r>
-              <a:rPr lang="en-US" sz="3200" dirty="0" err="1"/>
-              <a:t>Febrero</a:t>
-            </a:r>
-            <a:r>
-              <a:rPr lang="en-US" sz="3200" dirty="0"/>
-              <a:t> 2022</a:t>
-            </a:r>
-            <a:endParaRPr lang="en-US" sz="2000" dirty="0">
-              <a:solidFill>
-                <a:schemeClr val="tx1">
-                  <a:lumMod val="50000"/>
-                  <a:lumOff val="50000"/>
-                </a:schemeClr>
-              </a:solidFill>
-            </a:endParaRPr>
-          </a:p>
-        </p:txBody>
-      </p:sp>
-      <p:sp>
-        <p:nvSpPr>
-          <p:cNvPr id="4" name="Rectangle 3">
-            <a:extLst>
-              <a:ext uri="{FF2B5EF4-FFF2-40B4-BE49-F238E27FC236}">
-                <a16:creationId xmlns:a16="http://schemas.microsoft.com/office/drawing/2014/main" id="{D8843A03-435E-7540-A3E7-D35A280C5CFD}"/>
-              </a:ext>
-            </a:extLst>
-          </p:cNvPr>
-          <p:cNvSpPr/>
-          <p:nvPr/>
-        </p:nvSpPr>
-        <p:spPr>
-          <a:xfrm>
-            <a:off x="4114326" y="6134099"/>
-            <a:ext cx="4238212" cy="369332"/>
-          </a:xfrm>
-          <a:prstGeom prst="rect">
-            <a:avLst/>
-          </a:prstGeom>
-        </p:spPr>
-        <p:txBody>
-          <a:bodyPr wrap="none">
-            <a:spAutoFit/>
-          </a:bodyPr>
-          <a:lstStyle/>
-          <a:p>
-            <a:r>
-              <a:rPr lang="en-US" dirty="0" err="1">
-                <a:solidFill>
-                  <a:schemeClr val="tx1">
-                    <a:lumMod val="50000"/>
-                    <a:lumOff val="50000"/>
-                  </a:schemeClr>
-                </a:solidFill>
-              </a:rPr>
-              <a:t>Según</a:t>
-            </a:r>
-            <a:r>
-              <a:rPr lang="en-US" dirty="0">
-                <a:solidFill>
-                  <a:schemeClr val="tx1">
-                    <a:lumMod val="50000"/>
-                    <a:lumOff val="50000"/>
-                  </a:schemeClr>
-                </a:solidFill>
-              </a:rPr>
-              <a:t> </a:t>
-            </a:r>
-            <a:r>
-              <a:rPr lang="en-US" dirty="0" err="1">
-                <a:solidFill>
-                  <a:schemeClr val="tx1">
-                    <a:lumMod val="50000"/>
-                    <a:lumOff val="50000"/>
-                  </a:schemeClr>
-                </a:solidFill>
-              </a:rPr>
-              <a:t>umbrales</a:t>
-            </a:r>
-            <a:r>
-              <a:rPr lang="en-US" dirty="0">
-                <a:solidFill>
-                  <a:schemeClr val="tx1">
-                    <a:lumMod val="50000"/>
-                    <a:lumOff val="50000"/>
-                  </a:schemeClr>
-                </a:solidFill>
-              </a:rPr>
-              <a:t> </a:t>
-            </a:r>
-            <a:r>
-              <a:rPr lang="en-US" dirty="0" err="1">
-                <a:solidFill>
-                  <a:schemeClr val="tx1">
-                    <a:lumMod val="50000"/>
-                    <a:lumOff val="50000"/>
-                  </a:schemeClr>
-                </a:solidFill>
-              </a:rPr>
-              <a:t>definidos</a:t>
-            </a:r>
-            <a:r>
-              <a:rPr lang="en-US" dirty="0">
-                <a:solidFill>
-                  <a:schemeClr val="tx1">
-                    <a:lumMod val="50000"/>
-                    <a:lumOff val="50000"/>
-                  </a:schemeClr>
-                </a:solidFill>
-              </a:rPr>
-              <a:t> por ICOVID Chile</a:t>
-            </a:r>
-            <a:endParaRPr lang="en-US" dirty="0"/>
-          </a:p>
-        </p:txBody>
-      </p:sp>
-      <p:pic>
-        <p:nvPicPr>
-          <p:cNvPr id="3" name="Picture 2">
-            <a:extLst>
-              <a:ext uri="{FF2B5EF4-FFF2-40B4-BE49-F238E27FC236}">
-                <a16:creationId xmlns:a16="http://schemas.microsoft.com/office/drawing/2014/main" id="{492BF082-EC41-274E-9365-4348D8A5F733}"/>
-              </a:ext>
-            </a:extLst>
-          </p:cNvPr>
-          <p:cNvPicPr>
-            <a:picLocks noChangeAspect="1"/>
-          </p:cNvPicPr>
-          <p:nvPr/>
-        </p:nvPicPr>
-        <p:blipFill>
-          <a:blip r:embed="rId2"/>
-          <a:stretch>
-            <a:fillRect/>
-          </a:stretch>
-        </p:blipFill>
-        <p:spPr>
-          <a:xfrm>
-            <a:off x="534760" y="577420"/>
-            <a:ext cx="11122479" cy="5592170"/>
-          </a:xfrm>
-          <a:prstGeom prst="rect">
-            <a:avLst/>
-          </a:prstGeom>
-        </p:spPr>
-      </p:pic>
+            <a:r>
+              <a:rPr lang="en-US" sz="6000" dirty="0"/>
+              <a:t>SITUACIÓN REGIONAL</a:t>
+            </a:r>
+          </a:p>
+        </p:txBody>
+      </p:sp>
+      <p:sp>
+        <p:nvSpPr>
+          <p:cNvPr id="5" name="Title 4">
+            <a:extLst>
+              <a:ext uri="{FF2B5EF4-FFF2-40B4-BE49-F238E27FC236}">
+                <a16:creationId xmlns:a16="http://schemas.microsoft.com/office/drawing/2014/main" id="{5B465201-ED47-B64A-B505-4DDA25649C32}"/>
+              </a:ext>
+            </a:extLst>
+          </p:cNvPr>
+          <p:cNvSpPr>
+            <a:spLocks noGrp="1"/>
+          </p:cNvSpPr>
+          <p:nvPr>
+            <p:ph type="title"/>
+          </p:nvPr>
+        </p:nvSpPr>
+        <p:spPr/>
+        <p:txBody>
+          <a:bodyPr/>
+          <a:lstStyle/>
+          <a:p>
+            <a:endParaRPr lang="en-US"/>
+          </a:p>
+        </p:txBody>
+      </p:sp>
     </p:spTree>
     <p:extLst>
       <p:ext uri="{BB962C8B-B14F-4D97-AF65-F5344CB8AC3E}">
-        <p14:creationId xmlns:p14="http://schemas.microsoft.com/office/powerpoint/2010/main" val="2768918117"/>
+        <p14:creationId xmlns:p14="http://schemas.microsoft.com/office/powerpoint/2010/main" val="3222710163"/>
       </p:ext>
     </p:extLst>
   </p:cSld>
@@ -6128,8 +7013,8 @@
         </p:nvSpPr>
         <p:spPr>
           <a:xfrm>
-            <a:off x="2190140" y="28135"/>
-            <a:ext cx="7811754" cy="584775"/>
+            <a:off x="2738651" y="28135"/>
+            <a:ext cx="6714723" cy="584775"/>
           </a:xfrm>
           <a:prstGeom prst="rect">
             <a:avLst/>
@@ -6145,7 +7030,7 @@
             <a:pPr algn="ctr"/>
             <a:r>
               <a:rPr lang="en-US" sz="3200" dirty="0"/>
-              <a:t>REDUCIENDO POSITIVIDAD – 19 </a:t>
+              <a:t>NIVEL DE CONTAGIO – 19 </a:t>
             </a:r>
             <a:r>
               <a:rPr lang="en-US" sz="3200" dirty="0" err="1"/>
@@ -6268,7 +7153,7 @@
           <p:cNvPr id="3" name="Picture 2">
             <a:extLst>
               <a:ext uri="{FF2B5EF4-FFF2-40B4-BE49-F238E27FC236}">
-                <a16:creationId xmlns:a16="http://schemas.microsoft.com/office/drawing/2014/main" id="{30788CC0-7AE8-9B40-A199-B2D8197AF30D}"/>
+                <a16:creationId xmlns:a16="http://schemas.microsoft.com/office/drawing/2014/main" id="{492BF082-EC41-274E-9365-4348D8A5F733}"/>
               </a:ext>
             </a:extLst>
           </p:cNvPr>
@@ -6285,8 +7170,8 @@
         </p:blipFill>
         <p:spPr>
           <a:xfrm>
-            <a:off x="393700" y="571500"/>
-            <a:ext cx="11188700" cy="5606810"/>
+            <a:off x="534760" y="577420"/>
+            <a:ext cx="11122479" cy="5592170"/>
           </a:xfrm>
           <a:prstGeom prst="rect">
             <a:avLst/>
@@ -6296,7 +7181,7 @@
     </p:spTree>
     <p:extLst>
       <p:ext uri="{BB962C8B-B14F-4D97-AF65-F5344CB8AC3E}">
-        <p14:creationId xmlns:p14="http://schemas.microsoft.com/office/powerpoint/2010/main" val="3541962962"/>
+        <p14:creationId xmlns:p14="http://schemas.microsoft.com/office/powerpoint/2010/main" val="2768918117"/>
       </p:ext>
     </p:extLst>
   </p:cSld>
@@ -6337,8 +7222,8 @@
         </p:nvSpPr>
         <p:spPr>
           <a:xfrm>
-            <a:off x="2064303" y="28135"/>
-            <a:ext cx="8063426" cy="584775"/>
+            <a:off x="2190140" y="28135"/>
+            <a:ext cx="7811754" cy="584775"/>
           </a:xfrm>
           <a:prstGeom prst="rect">
             <a:avLst/>
@@ -6354,7 +7239,7 @@
             <a:pPr algn="ctr"/>
             <a:r>
               <a:rPr lang="en-US" sz="3200" dirty="0"/>
-              <a:t>AUMENTANDO POSITIVIDAD – 19 </a:t>
+              <a:t>REDUCIENDO POSITIVIDAD – 19 </a:t>
             </a:r>
             <a:r>
               <a:rPr lang="en-US" sz="3200" dirty="0" err="1"/>
@@ -6474,10 +7359,10 @@
       </p:sp>
       <p:pic>
         <p:nvPicPr>
-          <p:cNvPr id="2" name="Picture 1">
-            <a:extLst>
-              <a:ext uri="{FF2B5EF4-FFF2-40B4-BE49-F238E27FC236}">
-                <a16:creationId xmlns:a16="http://schemas.microsoft.com/office/drawing/2014/main" id="{DDEB2432-D283-C447-B126-269D29D26351}"/>
+          <p:cNvPr id="3" name="Picture 2">
+            <a:extLst>
+              <a:ext uri="{FF2B5EF4-FFF2-40B4-BE49-F238E27FC236}">
+                <a16:creationId xmlns:a16="http://schemas.microsoft.com/office/drawing/2014/main" id="{30788CC0-7AE8-9B40-A199-B2D8197AF30D}"/>
               </a:ext>
             </a:extLst>
           </p:cNvPr>
@@ -6494,8 +7379,8 @@
         </p:blipFill>
         <p:spPr>
           <a:xfrm>
-            <a:off x="406400" y="558800"/>
-            <a:ext cx="11132457" cy="5615927"/>
+            <a:off x="393700" y="571500"/>
+            <a:ext cx="11188700" cy="5606810"/>
           </a:xfrm>
           <a:prstGeom prst="rect">
             <a:avLst/>
@@ -6505,7 +7390,7 @@
     </p:spTree>
     <p:extLst>
       <p:ext uri="{BB962C8B-B14F-4D97-AF65-F5344CB8AC3E}">
-        <p14:creationId xmlns:p14="http://schemas.microsoft.com/office/powerpoint/2010/main" val="44235847"/>
+        <p14:creationId xmlns:p14="http://schemas.microsoft.com/office/powerpoint/2010/main" val="3541962962"/>
       </p:ext>
     </p:extLst>
   </p:cSld>
@@ -6624,10 +7509,10 @@
       </p:grpSpPr>
       <p:sp>
         <p:nvSpPr>
-          <p:cNvPr id="5" name="TextBox 4">
-            <a:extLst>
-              <a:ext uri="{FF2B5EF4-FFF2-40B4-BE49-F238E27FC236}">
-                <a16:creationId xmlns:a16="http://schemas.microsoft.com/office/drawing/2014/main" id="{5812A473-A74C-FC4F-8976-C670E80DF397}"/>
+          <p:cNvPr id="7" name="TextBox 6">
+            <a:extLst>
+              <a:ext uri="{FF2B5EF4-FFF2-40B4-BE49-F238E27FC236}">
+                <a16:creationId xmlns:a16="http://schemas.microsoft.com/office/drawing/2014/main" id="{55690B03-9D47-C14E-B04F-CDC54442A1B8}"/>
               </a:ext>
             </a:extLst>
           </p:cNvPr>
@@ -6636,8 +7521,8 @@
         </p:nvSpPr>
         <p:spPr>
           <a:xfrm>
-            <a:off x="0" y="6448620"/>
-            <a:ext cx="8132354" cy="369332"/>
+            <a:off x="2064303" y="28135"/>
+            <a:ext cx="8063426" cy="584775"/>
           </a:xfrm>
           <a:prstGeom prst="rect">
             <a:avLst/>
@@ -6650,142 +7535,133 @@
           </a:bodyPr>
           <a:lstStyle/>
           <a:p>
-            <a:r>
-              <a:rPr lang="en-US" dirty="0"/>
-              <a:t>Fuente: Centro de </a:t>
-            </a:r>
-            <a:r>
-              <a:rPr lang="en-US" dirty="0" err="1"/>
-              <a:t>Modelamiento</a:t>
-            </a:r>
-            <a:r>
-              <a:rPr lang="en-US" dirty="0"/>
-              <a:t> </a:t>
-            </a:r>
-            <a:r>
-              <a:rPr lang="en-US" dirty="0" err="1"/>
-              <a:t>Matemático</a:t>
-            </a:r>
-            <a:r>
-              <a:rPr lang="en-US" dirty="0"/>
-              <a:t>, http://covid-19vis.cmm.uchile.cl/race</a:t>
-            </a:r>
-          </a:p>
-        </p:txBody>
-      </p:sp>
-      <p:sp>
-        <p:nvSpPr>
-          <p:cNvPr id="6" name="TextBox 5">
-            <a:extLst>
-              <a:ext uri="{FF2B5EF4-FFF2-40B4-BE49-F238E27FC236}">
-                <a16:creationId xmlns:a16="http://schemas.microsoft.com/office/drawing/2014/main" id="{74423459-FDA9-4647-8DC3-91E9FEA07904}"/>
-              </a:ext>
-            </a:extLst>
-          </p:cNvPr>
-          <p:cNvSpPr txBox="1"/>
+            <a:pPr algn="ctr"/>
+            <a:r>
+              <a:rPr lang="en-US" sz="3200" dirty="0"/>
+              <a:t>AUMENTANDO POSITIVIDAD – 19 </a:t>
+            </a:r>
+            <a:r>
+              <a:rPr lang="en-US" sz="3200" dirty="0" err="1"/>
+              <a:t>Febrero</a:t>
+            </a:r>
+            <a:r>
+              <a:rPr lang="en-US" sz="3200" dirty="0"/>
+              <a:t> 2022</a:t>
+            </a:r>
+            <a:endParaRPr lang="en-US" sz="2000" dirty="0">
+              <a:solidFill>
+                <a:schemeClr val="tx1">
+                  <a:lumMod val="50000"/>
+                  <a:lumOff val="50000"/>
+                </a:schemeClr>
+              </a:solidFill>
+            </a:endParaRPr>
+          </a:p>
+        </p:txBody>
+      </p:sp>
+      <p:sp>
+        <p:nvSpPr>
+          <p:cNvPr id="4" name="Rectangle 3">
+            <a:extLst>
+              <a:ext uri="{FF2B5EF4-FFF2-40B4-BE49-F238E27FC236}">
+                <a16:creationId xmlns:a16="http://schemas.microsoft.com/office/drawing/2014/main" id="{D8843A03-435E-7540-A3E7-D35A280C5CFD}"/>
+              </a:ext>
+            </a:extLst>
+          </p:cNvPr>
+          <p:cNvSpPr/>
           <p:nvPr/>
         </p:nvSpPr>
         <p:spPr>
           <a:xfrm>
-            <a:off x="1966600" y="-18567"/>
-            <a:ext cx="8258799" cy="738664"/>
+            <a:off x="4114326" y="6134099"/>
+            <a:ext cx="4238212" cy="369332"/>
           </a:xfrm>
           <a:prstGeom prst="rect">
             <a:avLst/>
           </a:prstGeom>
-          <a:noFill/>
-        </p:spPr>
-        <p:txBody>
-          <a:bodyPr wrap="none" rtlCol="0">
+        </p:spPr>
+        <p:txBody>
+          <a:bodyPr wrap="none">
             <a:spAutoFit/>
           </a:bodyPr>
           <a:lstStyle/>
           <a:p>
-            <a:pPr algn="ctr"/>
-            <a:r>
-              <a:rPr lang="en-US" sz="2400" dirty="0" err="1"/>
-              <a:t>Número</a:t>
-            </a:r>
-            <a:r>
-              <a:rPr lang="en-US" sz="2400" dirty="0"/>
+            <a:r>
+              <a:rPr lang="en-US" dirty="0" err="1">
+                <a:solidFill>
+                  <a:schemeClr val="tx1">
+                    <a:lumMod val="50000"/>
+                    <a:lumOff val="50000"/>
+                  </a:schemeClr>
+                </a:solidFill>
+              </a:rPr>
+              <a:t>Según</a:t>
+            </a:r>
+            <a:r>
+              <a:rPr lang="en-US" dirty="0">
+                <a:solidFill>
+                  <a:schemeClr val="tx1">
+                    <a:lumMod val="50000"/>
+                    <a:lumOff val="50000"/>
+                  </a:schemeClr>
+                </a:solidFill>
+              </a:rPr>
               <a:t> </a:t>
             </a:r>
             <a:r>
-              <a:rPr lang="en-US" sz="2400" dirty="0" err="1"/>
-              <a:t>reproductivo</a:t>
-            </a:r>
-            <a:r>
-              <a:rPr lang="en-US" sz="2400" dirty="0"/>
+              <a:rPr lang="en-US" dirty="0" err="1">
+                <a:solidFill>
+                  <a:schemeClr val="tx1">
+                    <a:lumMod val="50000"/>
+                    <a:lumOff val="50000"/>
+                  </a:schemeClr>
+                </a:solidFill>
+              </a:rPr>
+              <a:t>umbrales</a:t>
+            </a:r>
+            <a:r>
+              <a:rPr lang="en-US" dirty="0">
+                <a:solidFill>
+                  <a:schemeClr val="tx1">
+                    <a:lumMod val="50000"/>
+                    <a:lumOff val="50000"/>
+                  </a:schemeClr>
+                </a:solidFill>
+              </a:rPr>
               <a:t> </a:t>
             </a:r>
             <a:r>
-              <a:rPr lang="en-US" sz="2400" dirty="0" err="1"/>
-              <a:t>efectivo</a:t>
-            </a:r>
-            <a:r>
-              <a:rPr lang="en-US" sz="2400" dirty="0"/>
-              <a:t> (o R </a:t>
-            </a:r>
-            <a:r>
-              <a:rPr lang="en-US" sz="2400" dirty="0" err="1"/>
-              <a:t>efectivo</a:t>
-            </a:r>
-            <a:r>
-              <a:rPr lang="en-US" sz="2400" dirty="0"/>
-              <a:t>) </a:t>
-            </a:r>
-          </a:p>
-          <a:p>
-            <a:pPr algn="ctr"/>
-            <a:r>
-              <a:rPr lang="en-US" dirty="0" err="1"/>
-              <a:t>Corresponde</a:t>
-            </a:r>
-            <a:r>
-              <a:rPr lang="en-US" dirty="0"/>
-              <a:t> al </a:t>
-            </a:r>
-            <a:r>
-              <a:rPr lang="en-US" dirty="0" err="1"/>
-              <a:t>número</a:t>
-            </a:r>
-            <a:r>
-              <a:rPr lang="en-US" dirty="0"/>
-              <a:t> </a:t>
-            </a:r>
-            <a:r>
-              <a:rPr lang="en-US" dirty="0" err="1"/>
-              <a:t>promedio</a:t>
-            </a:r>
-            <a:r>
-              <a:rPr lang="en-US" dirty="0"/>
-              <a:t> de personas </a:t>
-            </a:r>
-            <a:r>
-              <a:rPr lang="en-US" dirty="0" err="1"/>
-              <a:t>infectadas</a:t>
-            </a:r>
-            <a:r>
-              <a:rPr lang="en-US" dirty="0"/>
-              <a:t> por una persona </a:t>
-            </a:r>
-            <a:r>
-              <a:rPr lang="en-US" dirty="0" err="1"/>
-              <a:t>infecciosa</a:t>
-            </a:r>
-            <a:r>
-              <a:rPr lang="en-US" dirty="0"/>
-              <a:t>. </a:t>
-            </a:r>
+              <a:rPr lang="en-US" dirty="0" err="1">
+                <a:solidFill>
+                  <a:schemeClr val="tx1">
+                    <a:lumMod val="50000"/>
+                    <a:lumOff val="50000"/>
+                  </a:schemeClr>
+                </a:solidFill>
+              </a:rPr>
+              <a:t>definidos</a:t>
+            </a:r>
+            <a:r>
+              <a:rPr lang="en-US" dirty="0">
+                <a:solidFill>
+                  <a:schemeClr val="tx1">
+                    <a:lumMod val="50000"/>
+                    <a:lumOff val="50000"/>
+                  </a:schemeClr>
+                </a:solidFill>
+              </a:rPr>
+              <a:t> por ICOVID Chile</a:t>
+            </a:r>
+            <a:endParaRPr lang="en-US" dirty="0"/>
           </a:p>
         </p:txBody>
       </p:sp>
       <p:pic>
         <p:nvPicPr>
-          <p:cNvPr id="3" name="Picture 2" descr="A screenshot of a computer&#10;&#10;Description automatically generated with medium confidence">
-            <a:extLst>
-              <a:ext uri="{FF2B5EF4-FFF2-40B4-BE49-F238E27FC236}">
-                <a16:creationId xmlns:a16="http://schemas.microsoft.com/office/drawing/2014/main" id="{B9D41EB4-C60D-9C47-9E9F-6EEA93E214DE}"/>
+          <p:cNvPr id="2" name="Picture 1">
+            <a:extLst>
+              <a:ext uri="{FF2B5EF4-FFF2-40B4-BE49-F238E27FC236}">
+                <a16:creationId xmlns:a16="http://schemas.microsoft.com/office/drawing/2014/main" id="{DDEB2432-D283-C447-B126-269D29D26351}"/>
               </a:ext>
             </a:extLst>
           </p:cNvPr>
@@ -6802,8 +7678,8 @@
         </p:blipFill>
         <p:spPr>
           <a:xfrm>
-            <a:off x="696685" y="631049"/>
-            <a:ext cx="10798629" cy="5864010"/>
+            <a:off x="406400" y="558800"/>
+            <a:ext cx="11132457" cy="5615927"/>
           </a:xfrm>
           <a:prstGeom prst="rect">
             <a:avLst/>
@@ -6813,7 +7689,7 @@
     </p:spTree>
     <p:extLst>
       <p:ext uri="{BB962C8B-B14F-4D97-AF65-F5344CB8AC3E}">
-        <p14:creationId xmlns:p14="http://schemas.microsoft.com/office/powerpoint/2010/main" val="1545126083"/>
+        <p14:creationId xmlns:p14="http://schemas.microsoft.com/office/powerpoint/2010/main" val="44235847"/>
       </p:ext>
     </p:extLst>
   </p:cSld>
@@ -6840,12 +7716,102 @@
           <a:chExt cx="0" cy="0"/>
         </a:xfrm>
       </p:grpSpPr>
-      <p:sp>
-        <p:nvSpPr>
-          <p:cNvPr id="9" name="TextBox 8">
-            <a:extLst>
-              <a:ext uri="{FF2B5EF4-FFF2-40B4-BE49-F238E27FC236}">
-                <a16:creationId xmlns:a16="http://schemas.microsoft.com/office/drawing/2014/main" id="{22433A70-977D-C840-9BCB-9ECF9B80CB77}"/>
+      <p:pic>
+        <p:nvPicPr>
+          <p:cNvPr id="3" name="Picture 2">
+            <a:extLst>
+              <a:ext uri="{FF2B5EF4-FFF2-40B4-BE49-F238E27FC236}">
+                <a16:creationId xmlns:a16="http://schemas.microsoft.com/office/drawing/2014/main" id="{7F6766F0-B9E1-5846-968A-375DEC24F604}"/>
+              </a:ext>
+            </a:extLst>
+          </p:cNvPr>
+          <p:cNvPicPr>
+            <a:picLocks noChangeAspect="1"/>
+          </p:cNvPicPr>
+          <p:nvPr/>
+        </p:nvPicPr>
+        <p:blipFill>
+          <a:blip r:embed="rId2"/>
+          <a:stretch>
+            <a:fillRect/>
+          </a:stretch>
+        </p:blipFill>
+        <p:spPr>
+          <a:xfrm>
+            <a:off x="634354" y="1184939"/>
+            <a:ext cx="3764549" cy="3546719"/>
+          </a:xfrm>
+          <a:prstGeom prst="rect">
+            <a:avLst/>
+          </a:prstGeom>
+        </p:spPr>
+      </p:pic>
+      <p:pic>
+        <p:nvPicPr>
+          <p:cNvPr id="5" name="Picture 4">
+            <a:extLst>
+              <a:ext uri="{FF2B5EF4-FFF2-40B4-BE49-F238E27FC236}">
+                <a16:creationId xmlns:a16="http://schemas.microsoft.com/office/drawing/2014/main" id="{D8AD05A6-6683-1D4C-A5A4-7BA444673D10}"/>
+              </a:ext>
+            </a:extLst>
+          </p:cNvPr>
+          <p:cNvPicPr>
+            <a:picLocks noChangeAspect="1"/>
+          </p:cNvPicPr>
+          <p:nvPr/>
+        </p:nvPicPr>
+        <p:blipFill>
+          <a:blip r:embed="rId3"/>
+          <a:stretch>
+            <a:fillRect/>
+          </a:stretch>
+        </p:blipFill>
+        <p:spPr>
+          <a:xfrm>
+            <a:off x="4527896" y="1291770"/>
+            <a:ext cx="3770562" cy="3512459"/>
+          </a:xfrm>
+          <a:prstGeom prst="rect">
+            <a:avLst/>
+          </a:prstGeom>
+        </p:spPr>
+      </p:pic>
+      <p:pic>
+        <p:nvPicPr>
+          <p:cNvPr id="6" name="Picture 5">
+            <a:extLst>
+              <a:ext uri="{FF2B5EF4-FFF2-40B4-BE49-F238E27FC236}">
+                <a16:creationId xmlns:a16="http://schemas.microsoft.com/office/drawing/2014/main" id="{0B672B4C-0CF0-5346-8E41-0722468D320C}"/>
+              </a:ext>
+            </a:extLst>
+          </p:cNvPr>
+          <p:cNvPicPr>
+            <a:picLocks noChangeAspect="1"/>
+          </p:cNvPicPr>
+          <p:nvPr/>
+        </p:nvPicPr>
+        <p:blipFill>
+          <a:blip r:embed="rId4"/>
+          <a:stretch>
+            <a:fillRect/>
+          </a:stretch>
+        </p:blipFill>
+        <p:spPr>
+          <a:xfrm>
+            <a:off x="8427451" y="1291770"/>
+            <a:ext cx="3764549" cy="3512459"/>
+          </a:xfrm>
+          <a:prstGeom prst="rect">
+            <a:avLst/>
+          </a:prstGeom>
+        </p:spPr>
+      </p:pic>
+      <p:sp>
+        <p:nvSpPr>
+          <p:cNvPr id="8" name="TextBox 7">
+            <a:extLst>
+              <a:ext uri="{FF2B5EF4-FFF2-40B4-BE49-F238E27FC236}">
+                <a16:creationId xmlns:a16="http://schemas.microsoft.com/office/drawing/2014/main" id="{1FB87226-00CC-DB46-85DA-20186796282D}"/>
               </a:ext>
             </a:extLst>
           </p:cNvPr>
@@ -6854,8 +7820,8 @@
         </p:nvSpPr>
         <p:spPr>
           <a:xfrm>
-            <a:off x="4156518" y="0"/>
-            <a:ext cx="4475712" cy="707886"/>
+            <a:off x="5857191" y="116114"/>
+            <a:ext cx="1111971" cy="369332"/>
           </a:xfrm>
           <a:prstGeom prst="rect">
             <a:avLst/>
@@ -6869,291 +7835,16 @@
           <a:lstStyle/>
           <a:p>
             <a:r>
-              <a:rPr lang="en-US" sz="4000" dirty="0"/>
-              <a:t>RESUMEN SEMANAL</a:t>
-            </a:r>
-          </a:p>
-        </p:txBody>
-      </p:sp>
-      <p:sp>
-        <p:nvSpPr>
-          <p:cNvPr id="3" name="Rectangle 2">
-            <a:extLst>
-              <a:ext uri="{FF2B5EF4-FFF2-40B4-BE49-F238E27FC236}">
-                <a16:creationId xmlns:a16="http://schemas.microsoft.com/office/drawing/2014/main" id="{23A63C90-DCF1-FF43-ADFA-D8F0C39EA90F}"/>
-              </a:ext>
-            </a:extLst>
-          </p:cNvPr>
-          <p:cNvSpPr/>
-          <p:nvPr/>
-        </p:nvSpPr>
-        <p:spPr>
-          <a:xfrm>
-            <a:off x="462140" y="1610486"/>
-            <a:ext cx="4824000" cy="1446550"/>
-          </a:xfrm>
-          <a:prstGeom prst="rect">
-            <a:avLst/>
-          </a:prstGeom>
-          <a:ln>
-            <a:solidFill>
-              <a:schemeClr val="tx1">
-                <a:lumMod val="50000"/>
-                <a:lumOff val="50000"/>
-              </a:schemeClr>
-            </a:solidFill>
-          </a:ln>
-        </p:spPr>
-        <p:txBody>
-          <a:bodyPr wrap="square">
-            <a:spAutoFit/>
-          </a:bodyPr>
-          <a:lstStyle/>
-          <a:p>
-            <a:pPr algn="ctr"/>
-            <a:r>
-              <a:rPr lang="en-US" sz="3200" dirty="0" err="1">
-                <a:solidFill>
-                  <a:schemeClr val="tx1">
-                    <a:lumMod val="65000"/>
-                    <a:lumOff val="35000"/>
-                  </a:schemeClr>
-                </a:solidFill>
-              </a:rPr>
-              <a:t>Hospitalizaciones</a:t>
-            </a:r>
-            <a:endParaRPr lang="en-US" dirty="0"/>
-          </a:p>
-          <a:p>
-            <a:pPr algn="ctr"/>
-            <a:r>
-              <a:rPr lang="en-US" sz="2800" dirty="0">
-                <a:solidFill>
-                  <a:schemeClr val="tx1">
-                    <a:lumMod val="65000"/>
-                    <a:lumOff val="35000"/>
-                  </a:schemeClr>
-                </a:solidFill>
-              </a:rPr>
-              <a:t>UCI, UTI, </a:t>
-            </a:r>
-            <a:r>
-              <a:rPr lang="en-US" sz="2800" dirty="0" err="1">
-                <a:solidFill>
-                  <a:schemeClr val="tx1">
-                    <a:lumMod val="65000"/>
-                    <a:lumOff val="35000"/>
-                  </a:schemeClr>
-                </a:solidFill>
-              </a:rPr>
-              <a:t>Básica</a:t>
-            </a:r>
-            <a:r>
-              <a:rPr lang="en-US" sz="2800" dirty="0">
-                <a:solidFill>
-                  <a:schemeClr val="tx1">
-                    <a:lumMod val="65000"/>
-                    <a:lumOff val="35000"/>
-                  </a:schemeClr>
-                </a:solidFill>
-              </a:rPr>
-              <a:t> y Media </a:t>
-            </a:r>
-          </a:p>
-          <a:p>
-            <a:pPr algn="ctr"/>
-            <a:r>
-              <a:rPr lang="en-US" sz="2800" b="1" dirty="0">
-                <a:solidFill>
-                  <a:srgbClr val="FF0000"/>
-                </a:solidFill>
-              </a:rPr>
-              <a:t>ALTO Y SUBIENDO</a:t>
-            </a:r>
-          </a:p>
-        </p:txBody>
-      </p:sp>
-      <p:sp>
-        <p:nvSpPr>
-          <p:cNvPr id="6" name="Rectangle 5">
-            <a:extLst>
-              <a:ext uri="{FF2B5EF4-FFF2-40B4-BE49-F238E27FC236}">
-                <a16:creationId xmlns:a16="http://schemas.microsoft.com/office/drawing/2014/main" id="{123C3ADC-F344-EC47-BE69-A5C7C2F032A1}"/>
-              </a:ext>
-            </a:extLst>
-          </p:cNvPr>
-          <p:cNvSpPr/>
-          <p:nvPr/>
-        </p:nvSpPr>
-        <p:spPr>
-          <a:xfrm>
-            <a:off x="6825529" y="1614877"/>
-            <a:ext cx="4823999" cy="1292662"/>
-          </a:xfrm>
-          <a:prstGeom prst="rect">
-            <a:avLst/>
-          </a:prstGeom>
-          <a:ln>
-            <a:solidFill>
-              <a:schemeClr val="tx1">
-                <a:lumMod val="50000"/>
-                <a:lumOff val="50000"/>
-              </a:schemeClr>
-            </a:solidFill>
-          </a:ln>
-        </p:spPr>
-        <p:txBody>
-          <a:bodyPr wrap="square">
-            <a:spAutoFit/>
-          </a:bodyPr>
-          <a:lstStyle/>
-          <a:p>
-            <a:pPr algn="ctr"/>
-            <a:r>
-              <a:rPr lang="en-US" sz="3200" dirty="0" err="1">
-                <a:solidFill>
-                  <a:schemeClr val="tx1">
-                    <a:lumMod val="65000"/>
-                    <a:lumOff val="35000"/>
-                  </a:schemeClr>
-                </a:solidFill>
-              </a:rPr>
-              <a:t>Fallecidos</a:t>
-            </a:r>
-            <a:r>
-              <a:rPr lang="en-US" sz="3200" dirty="0">
-                <a:solidFill>
-                  <a:schemeClr val="tx1">
-                    <a:lumMod val="65000"/>
-                    <a:lumOff val="35000"/>
-                  </a:schemeClr>
-                </a:solidFill>
-              </a:rPr>
-              <a:t> </a:t>
-            </a:r>
-            <a:r>
-              <a:rPr lang="en-US" sz="3200" dirty="0" err="1">
-                <a:solidFill>
-                  <a:schemeClr val="tx1">
-                    <a:lumMod val="65000"/>
-                    <a:lumOff val="35000"/>
-                  </a:schemeClr>
-                </a:solidFill>
-              </a:rPr>
-              <a:t>semanales</a:t>
-            </a:r>
-            <a:endParaRPr lang="en-US" sz="3200" dirty="0">
-              <a:solidFill>
-                <a:schemeClr val="tx1">
-                  <a:lumMod val="65000"/>
-                  <a:lumOff val="35000"/>
-                </a:schemeClr>
-              </a:solidFill>
-            </a:endParaRPr>
-          </a:p>
-          <a:p>
-            <a:pPr algn="ctr"/>
-            <a:endParaRPr lang="en-US" dirty="0"/>
-          </a:p>
-          <a:p>
-            <a:pPr algn="ctr"/>
-            <a:r>
-              <a:rPr lang="en-US" sz="2800" b="1" dirty="0">
-                <a:solidFill>
-                  <a:srgbClr val="FF0000"/>
-                </a:solidFill>
-              </a:rPr>
-              <a:t>ALTO Y SUBIENDO</a:t>
-            </a:r>
-            <a:endParaRPr lang="en-US" sz="2800" b="1" dirty="0">
-              <a:solidFill>
-                <a:srgbClr val="00417C"/>
-              </a:solidFill>
-            </a:endParaRPr>
-          </a:p>
-        </p:txBody>
-      </p:sp>
-      <p:sp>
-        <p:nvSpPr>
-          <p:cNvPr id="8" name="Rectangle 7">
-            <a:extLst>
-              <a:ext uri="{FF2B5EF4-FFF2-40B4-BE49-F238E27FC236}">
-                <a16:creationId xmlns:a16="http://schemas.microsoft.com/office/drawing/2014/main" id="{0811E62D-18FC-C040-AC7D-3ACBA4D09B8E}"/>
-              </a:ext>
-            </a:extLst>
-          </p:cNvPr>
-          <p:cNvSpPr/>
-          <p:nvPr/>
-        </p:nvSpPr>
-        <p:spPr>
-          <a:xfrm>
-            <a:off x="1925460" y="4082746"/>
-            <a:ext cx="8937827" cy="1723549"/>
-          </a:xfrm>
-          <a:prstGeom prst="rect">
-            <a:avLst/>
-          </a:prstGeom>
-          <a:ln>
-            <a:solidFill>
-              <a:schemeClr val="tx1">
-                <a:lumMod val="50000"/>
-                <a:lumOff val="50000"/>
-              </a:schemeClr>
-            </a:solidFill>
-          </a:ln>
-        </p:spPr>
-        <p:txBody>
-          <a:bodyPr wrap="square">
-            <a:spAutoFit/>
-          </a:bodyPr>
-          <a:lstStyle/>
-          <a:p>
-            <a:pPr algn="ctr"/>
-            <a:r>
-              <a:rPr lang="en-US" sz="3200" dirty="0">
-                <a:solidFill>
-                  <a:schemeClr val="tx1">
-                    <a:lumMod val="65000"/>
-                    <a:lumOff val="35000"/>
-                  </a:schemeClr>
-                </a:solidFill>
-              </a:rPr>
-              <a:t>NIVEL DE CONTAGIOS</a:t>
-            </a:r>
-          </a:p>
-          <a:p>
-            <a:pPr algn="ctr"/>
-            <a:endParaRPr lang="en-US" dirty="0"/>
-          </a:p>
-          <a:p>
-            <a:pPr algn="ctr"/>
-            <a:r>
-              <a:rPr lang="en-US" sz="2800" b="1" dirty="0">
-                <a:solidFill>
-                  <a:srgbClr val="FF0000"/>
-                </a:solidFill>
-              </a:rPr>
-              <a:t>MUY ALTO EN TODAS LAS REGIONES</a:t>
-            </a:r>
-          </a:p>
-          <a:p>
-            <a:pPr algn="ctr"/>
-            <a:r>
-              <a:rPr lang="en-US" sz="2800" b="1" dirty="0">
-                <a:solidFill>
-                  <a:srgbClr val="FF0000"/>
-                </a:solidFill>
-              </a:rPr>
-              <a:t>SUBIENDO EN MUCHAS REGIONES</a:t>
-            </a:r>
-            <a:endParaRPr lang="en-US" dirty="0"/>
+              <a:rPr lang="en-US" dirty="0"/>
+              <a:t>ATACAMA</a:t>
+            </a:r>
           </a:p>
         </p:txBody>
       </p:sp>
     </p:spTree>
     <p:extLst>
       <p:ext uri="{BB962C8B-B14F-4D97-AF65-F5344CB8AC3E}">
-        <p14:creationId xmlns:p14="http://schemas.microsoft.com/office/powerpoint/2010/main" val="319308570"/>
+        <p14:creationId xmlns:p14="http://schemas.microsoft.com/office/powerpoint/2010/main" val="3685434599"/>
       </p:ext>
     </p:extLst>
   </p:cSld>
@@ -7182,10 +7873,10 @@
       </p:grpSpPr>
       <p:sp>
         <p:nvSpPr>
-          <p:cNvPr id="4" name="TextBox 3">
-            <a:extLst>
-              <a:ext uri="{FF2B5EF4-FFF2-40B4-BE49-F238E27FC236}">
-                <a16:creationId xmlns:a16="http://schemas.microsoft.com/office/drawing/2014/main" id="{5BCAFE7A-E299-D14E-9413-EB5C984AF441}"/>
+          <p:cNvPr id="8" name="TextBox 7">
+            <a:extLst>
+              <a:ext uri="{FF2B5EF4-FFF2-40B4-BE49-F238E27FC236}">
+                <a16:creationId xmlns:a16="http://schemas.microsoft.com/office/drawing/2014/main" id="{1FB87226-00CC-DB46-85DA-20186796282D}"/>
               </a:ext>
             </a:extLst>
           </p:cNvPr>
@@ -7194,8 +7885,8 @@
         </p:nvSpPr>
         <p:spPr>
           <a:xfrm>
-            <a:off x="3621059" y="2846895"/>
-            <a:ext cx="4476610" cy="1015663"/>
+            <a:off x="5857191" y="116114"/>
+            <a:ext cx="1159485" cy="369332"/>
           </a:xfrm>
           <a:prstGeom prst="rect">
             <a:avLst/>
@@ -7209,41 +7900,106 @@
           <a:lstStyle/>
           <a:p>
             <a:r>
-              <a:rPr lang="en-US" sz="6000" dirty="0"/>
-              <a:t>VACUNACIÓN</a:t>
-            </a:r>
-          </a:p>
-        </p:txBody>
-      </p:sp>
-      <p:sp>
-        <p:nvSpPr>
-          <p:cNvPr id="5" name="Title 4">
-            <a:extLst>
-              <a:ext uri="{FF2B5EF4-FFF2-40B4-BE49-F238E27FC236}">
-                <a16:creationId xmlns:a16="http://schemas.microsoft.com/office/drawing/2014/main" id="{5B465201-ED47-B64A-B505-4DDA25649C32}"/>
-              </a:ext>
-            </a:extLst>
-          </p:cNvPr>
-          <p:cNvSpPr>
-            <a:spLocks noGrp="1"/>
-          </p:cNvSpPr>
-          <p:nvPr>
-            <p:ph type="title"/>
-          </p:nvPr>
-        </p:nvSpPr>
-        <p:spPr/>
-        <p:txBody>
-          <a:bodyPr/>
-          <a:lstStyle/>
-          <a:p>
-            <a:endParaRPr lang="en-US"/>
-          </a:p>
-        </p:txBody>
-      </p:sp>
+              <a:rPr lang="en-US" dirty="0"/>
+              <a:t>TARAPACÁ</a:t>
+            </a:r>
+          </a:p>
+        </p:txBody>
+      </p:sp>
+      <p:pic>
+        <p:nvPicPr>
+          <p:cNvPr id="2" name="Picture 1">
+            <a:extLst>
+              <a:ext uri="{FF2B5EF4-FFF2-40B4-BE49-F238E27FC236}">
+                <a16:creationId xmlns:a16="http://schemas.microsoft.com/office/drawing/2014/main" id="{96F206D3-C736-A048-B078-0571EA54DD5E}"/>
+              </a:ext>
+            </a:extLst>
+          </p:cNvPr>
+          <p:cNvPicPr>
+            <a:picLocks noChangeAspect="1"/>
+          </p:cNvPicPr>
+          <p:nvPr/>
+        </p:nvPicPr>
+        <p:blipFill>
+          <a:blip r:embed="rId2"/>
+          <a:stretch>
+            <a:fillRect/>
+          </a:stretch>
+        </p:blipFill>
+        <p:spPr>
+          <a:xfrm>
+            <a:off x="246992" y="1291770"/>
+            <a:ext cx="3633578" cy="3512459"/>
+          </a:xfrm>
+          <a:prstGeom prst="rect">
+            <a:avLst/>
+          </a:prstGeom>
+        </p:spPr>
+      </p:pic>
+      <p:pic>
+        <p:nvPicPr>
+          <p:cNvPr id="4" name="Picture 3">
+            <a:extLst>
+              <a:ext uri="{FF2B5EF4-FFF2-40B4-BE49-F238E27FC236}">
+                <a16:creationId xmlns:a16="http://schemas.microsoft.com/office/drawing/2014/main" id="{74610D48-FE8C-A444-B1C9-2ACB507AAD01}"/>
+              </a:ext>
+            </a:extLst>
+          </p:cNvPr>
+          <p:cNvPicPr>
+            <a:picLocks noChangeAspect="1"/>
+          </p:cNvPicPr>
+          <p:nvPr/>
+        </p:nvPicPr>
+        <p:blipFill>
+          <a:blip r:embed="rId3"/>
+          <a:stretch>
+            <a:fillRect/>
+          </a:stretch>
+        </p:blipFill>
+        <p:spPr>
+          <a:xfrm>
+            <a:off x="4040401" y="1291770"/>
+            <a:ext cx="3715753" cy="3512459"/>
+          </a:xfrm>
+          <a:prstGeom prst="rect">
+            <a:avLst/>
+          </a:prstGeom>
+        </p:spPr>
+      </p:pic>
+      <p:pic>
+        <p:nvPicPr>
+          <p:cNvPr id="7" name="Picture 6">
+            <a:extLst>
+              <a:ext uri="{FF2B5EF4-FFF2-40B4-BE49-F238E27FC236}">
+                <a16:creationId xmlns:a16="http://schemas.microsoft.com/office/drawing/2014/main" id="{535EEEBD-0068-8C48-9D72-8CFA808F96DA}"/>
+              </a:ext>
+            </a:extLst>
+          </p:cNvPr>
+          <p:cNvPicPr>
+            <a:picLocks noChangeAspect="1"/>
+          </p:cNvPicPr>
+          <p:nvPr/>
+        </p:nvPicPr>
+        <p:blipFill>
+          <a:blip r:embed="rId4"/>
+          <a:stretch>
+            <a:fillRect/>
+          </a:stretch>
+        </p:blipFill>
+        <p:spPr>
+          <a:xfrm>
+            <a:off x="7994831" y="1291769"/>
+            <a:ext cx="3715753" cy="3546855"/>
+          </a:xfrm>
+          <a:prstGeom prst="rect">
+            <a:avLst/>
+          </a:prstGeom>
+        </p:spPr>
+      </p:pic>
     </p:spTree>
     <p:extLst>
       <p:ext uri="{BB962C8B-B14F-4D97-AF65-F5344CB8AC3E}">
-        <p14:creationId xmlns:p14="http://schemas.microsoft.com/office/powerpoint/2010/main" val="568400835"/>
+        <p14:creationId xmlns:p14="http://schemas.microsoft.com/office/powerpoint/2010/main" val="3796695765"/>
       </p:ext>
     </p:extLst>
   </p:cSld>
@@ -7272,6 +8028,654 @@
       </p:grpSpPr>
       <p:sp>
         <p:nvSpPr>
+          <p:cNvPr id="5" name="TextBox 4">
+            <a:extLst>
+              <a:ext uri="{FF2B5EF4-FFF2-40B4-BE49-F238E27FC236}">
+                <a16:creationId xmlns:a16="http://schemas.microsoft.com/office/drawing/2014/main" id="{5812A473-A74C-FC4F-8976-C670E80DF397}"/>
+              </a:ext>
+            </a:extLst>
+          </p:cNvPr>
+          <p:cNvSpPr txBox="1"/>
+          <p:nvPr/>
+        </p:nvSpPr>
+        <p:spPr>
+          <a:xfrm>
+            <a:off x="0" y="6448620"/>
+            <a:ext cx="8132354" cy="369332"/>
+          </a:xfrm>
+          <a:prstGeom prst="rect">
+            <a:avLst/>
+          </a:prstGeom>
+          <a:noFill/>
+        </p:spPr>
+        <p:txBody>
+          <a:bodyPr wrap="none" rtlCol="0">
+            <a:spAutoFit/>
+          </a:bodyPr>
+          <a:lstStyle/>
+          <a:p>
+            <a:r>
+              <a:rPr lang="en-US" dirty="0"/>
+              <a:t>Fuente: Centro de </a:t>
+            </a:r>
+            <a:r>
+              <a:rPr lang="en-US" dirty="0" err="1"/>
+              <a:t>Modelamiento</a:t>
+            </a:r>
+            <a:r>
+              <a:rPr lang="en-US" dirty="0"/>
+              <a:t> </a:t>
+            </a:r>
+            <a:r>
+              <a:rPr lang="en-US" dirty="0" err="1"/>
+              <a:t>Matemático</a:t>
+            </a:r>
+            <a:r>
+              <a:rPr lang="en-US" dirty="0"/>
+              <a:t>, http://covid-19vis.cmm.uchile.cl/race</a:t>
+            </a:r>
+          </a:p>
+        </p:txBody>
+      </p:sp>
+      <p:sp>
+        <p:nvSpPr>
+          <p:cNvPr id="6" name="TextBox 5">
+            <a:extLst>
+              <a:ext uri="{FF2B5EF4-FFF2-40B4-BE49-F238E27FC236}">
+                <a16:creationId xmlns:a16="http://schemas.microsoft.com/office/drawing/2014/main" id="{74423459-FDA9-4647-8DC3-91E9FEA07904}"/>
+              </a:ext>
+            </a:extLst>
+          </p:cNvPr>
+          <p:cNvSpPr txBox="1"/>
+          <p:nvPr/>
+        </p:nvSpPr>
+        <p:spPr>
+          <a:xfrm>
+            <a:off x="1966600" y="-18567"/>
+            <a:ext cx="8258799" cy="738664"/>
+          </a:xfrm>
+          <a:prstGeom prst="rect">
+            <a:avLst/>
+          </a:prstGeom>
+          <a:noFill/>
+        </p:spPr>
+        <p:txBody>
+          <a:bodyPr wrap="none" rtlCol="0">
+            <a:spAutoFit/>
+          </a:bodyPr>
+          <a:lstStyle/>
+          <a:p>
+            <a:pPr algn="ctr"/>
+            <a:r>
+              <a:rPr lang="en-US" sz="2400" dirty="0" err="1"/>
+              <a:t>Número</a:t>
+            </a:r>
+            <a:r>
+              <a:rPr lang="en-US" sz="2400" dirty="0"/>
+              <a:t> </a:t>
+            </a:r>
+            <a:r>
+              <a:rPr lang="en-US" sz="2400" dirty="0" err="1"/>
+              <a:t>reproductivo</a:t>
+            </a:r>
+            <a:r>
+              <a:rPr lang="en-US" sz="2400" dirty="0"/>
+              <a:t> </a:t>
+            </a:r>
+            <a:r>
+              <a:rPr lang="en-US" sz="2400" dirty="0" err="1"/>
+              <a:t>efectivo</a:t>
+            </a:r>
+            <a:r>
+              <a:rPr lang="en-US" sz="2400" dirty="0"/>
+              <a:t> (o R </a:t>
+            </a:r>
+            <a:r>
+              <a:rPr lang="en-US" sz="2400" dirty="0" err="1"/>
+              <a:t>efectivo</a:t>
+            </a:r>
+            <a:r>
+              <a:rPr lang="en-US" sz="2400" dirty="0"/>
+              <a:t>) </a:t>
+            </a:r>
+          </a:p>
+          <a:p>
+            <a:pPr algn="ctr"/>
+            <a:r>
+              <a:rPr lang="en-US" dirty="0" err="1"/>
+              <a:t>Corresponde</a:t>
+            </a:r>
+            <a:r>
+              <a:rPr lang="en-US" dirty="0"/>
+              <a:t> al </a:t>
+            </a:r>
+            <a:r>
+              <a:rPr lang="en-US" dirty="0" err="1"/>
+              <a:t>número</a:t>
+            </a:r>
+            <a:r>
+              <a:rPr lang="en-US" dirty="0"/>
+              <a:t> </a:t>
+            </a:r>
+            <a:r>
+              <a:rPr lang="en-US" dirty="0" err="1"/>
+              <a:t>promedio</a:t>
+            </a:r>
+            <a:r>
+              <a:rPr lang="en-US" dirty="0"/>
+              <a:t> de personas </a:t>
+            </a:r>
+            <a:r>
+              <a:rPr lang="en-US" dirty="0" err="1"/>
+              <a:t>infectadas</a:t>
+            </a:r>
+            <a:r>
+              <a:rPr lang="en-US" dirty="0"/>
+              <a:t> por una persona </a:t>
+            </a:r>
+            <a:r>
+              <a:rPr lang="en-US" dirty="0" err="1"/>
+              <a:t>infecciosa</a:t>
+            </a:r>
+            <a:r>
+              <a:rPr lang="en-US" dirty="0"/>
+              <a:t>. </a:t>
+            </a:r>
+          </a:p>
+        </p:txBody>
+      </p:sp>
+      <p:pic>
+        <p:nvPicPr>
+          <p:cNvPr id="7" name="Picture 6" descr="A screenshot of a computer&#10;&#10;Description automatically generated with medium confidence">
+            <a:extLst>
+              <a:ext uri="{FF2B5EF4-FFF2-40B4-BE49-F238E27FC236}">
+                <a16:creationId xmlns:a16="http://schemas.microsoft.com/office/drawing/2014/main" id="{4945A60C-BC50-7348-9E5E-FD692CAEA39D}"/>
+              </a:ext>
+            </a:extLst>
+          </p:cNvPr>
+          <p:cNvPicPr>
+            <a:picLocks noChangeAspect="1"/>
+          </p:cNvPicPr>
+          <p:nvPr/>
+        </p:nvPicPr>
+        <p:blipFill>
+          <a:blip r:embed="rId2"/>
+          <a:stretch>
+            <a:fillRect/>
+          </a:stretch>
+        </p:blipFill>
+        <p:spPr>
+          <a:xfrm>
+            <a:off x="834570" y="734363"/>
+            <a:ext cx="10522857" cy="5714257"/>
+          </a:xfrm>
+          <a:prstGeom prst="rect">
+            <a:avLst/>
+          </a:prstGeom>
+        </p:spPr>
+      </p:pic>
+    </p:spTree>
+    <p:extLst>
+      <p:ext uri="{BB962C8B-B14F-4D97-AF65-F5344CB8AC3E}">
+        <p14:creationId xmlns:p14="http://schemas.microsoft.com/office/powerpoint/2010/main" val="1545126083"/>
+      </p:ext>
+    </p:extLst>
+  </p:cSld>
+  <p:clrMapOvr>
+    <a:masterClrMapping/>
+  </p:clrMapOvr>
+</p:sld>
+</file>
+
+<file path=ppt/slides/slide24.xml><?xml version="1.0" encoding="utf-8"?>
+<p:sld xmlns:a="http://schemas.openxmlformats.org/drawingml/2006/main" xmlns:r="http://schemas.openxmlformats.org/officeDocument/2006/relationships" xmlns:p="http://schemas.openxmlformats.org/presentationml/2006/main">
+  <p:cSld>
+    <p:spTree>
+      <p:nvGrpSpPr>
+        <p:cNvPr id="1" name=""/>
+        <p:cNvGrpSpPr/>
+        <p:nvPr/>
+      </p:nvGrpSpPr>
+      <p:grpSpPr>
+        <a:xfrm>
+          <a:off x="0" y="0"/>
+          <a:ext cx="0" cy="0"/>
+          <a:chOff x="0" y="0"/>
+          <a:chExt cx="0" cy="0"/>
+        </a:xfrm>
+      </p:grpSpPr>
+      <p:sp>
+        <p:nvSpPr>
+          <p:cNvPr id="9" name="TextBox 8">
+            <a:extLst>
+              <a:ext uri="{FF2B5EF4-FFF2-40B4-BE49-F238E27FC236}">
+                <a16:creationId xmlns:a16="http://schemas.microsoft.com/office/drawing/2014/main" id="{22433A70-977D-C840-9BCB-9ECF9B80CB77}"/>
+              </a:ext>
+            </a:extLst>
+          </p:cNvPr>
+          <p:cNvSpPr txBox="1"/>
+          <p:nvPr/>
+        </p:nvSpPr>
+        <p:spPr>
+          <a:xfrm>
+            <a:off x="4156518" y="0"/>
+            <a:ext cx="4475712" cy="707886"/>
+          </a:xfrm>
+          <a:prstGeom prst="rect">
+            <a:avLst/>
+          </a:prstGeom>
+          <a:noFill/>
+        </p:spPr>
+        <p:txBody>
+          <a:bodyPr wrap="none" rtlCol="0">
+            <a:spAutoFit/>
+          </a:bodyPr>
+          <a:lstStyle/>
+          <a:p>
+            <a:r>
+              <a:rPr lang="en-US" sz="4000" dirty="0"/>
+              <a:t>RESUMEN SEMANAL</a:t>
+            </a:r>
+          </a:p>
+        </p:txBody>
+      </p:sp>
+      <p:sp>
+        <p:nvSpPr>
+          <p:cNvPr id="3" name="Rectangle 2">
+            <a:extLst>
+              <a:ext uri="{FF2B5EF4-FFF2-40B4-BE49-F238E27FC236}">
+                <a16:creationId xmlns:a16="http://schemas.microsoft.com/office/drawing/2014/main" id="{23A63C90-DCF1-FF43-ADFA-D8F0C39EA90F}"/>
+              </a:ext>
+            </a:extLst>
+          </p:cNvPr>
+          <p:cNvSpPr/>
+          <p:nvPr/>
+        </p:nvSpPr>
+        <p:spPr>
+          <a:xfrm>
+            <a:off x="462140" y="1610486"/>
+            <a:ext cx="4824000" cy="1446550"/>
+          </a:xfrm>
+          <a:prstGeom prst="rect">
+            <a:avLst/>
+          </a:prstGeom>
+          <a:ln>
+            <a:solidFill>
+              <a:schemeClr val="tx1">
+                <a:lumMod val="50000"/>
+                <a:lumOff val="50000"/>
+              </a:schemeClr>
+            </a:solidFill>
+          </a:ln>
+        </p:spPr>
+        <p:txBody>
+          <a:bodyPr wrap="square">
+            <a:spAutoFit/>
+          </a:bodyPr>
+          <a:lstStyle/>
+          <a:p>
+            <a:pPr algn="ctr"/>
+            <a:r>
+              <a:rPr lang="en-US" sz="3200" dirty="0" err="1">
+                <a:solidFill>
+                  <a:schemeClr val="tx1">
+                    <a:lumMod val="65000"/>
+                    <a:lumOff val="35000"/>
+                  </a:schemeClr>
+                </a:solidFill>
+              </a:rPr>
+              <a:t>Hospitalizaciones</a:t>
+            </a:r>
+            <a:endParaRPr lang="en-US" dirty="0"/>
+          </a:p>
+          <a:p>
+            <a:pPr algn="ctr"/>
+            <a:r>
+              <a:rPr lang="en-US" sz="2800" dirty="0">
+                <a:solidFill>
+                  <a:schemeClr val="tx1">
+                    <a:lumMod val="65000"/>
+                    <a:lumOff val="35000"/>
+                  </a:schemeClr>
+                </a:solidFill>
+              </a:rPr>
+              <a:t>UCI, UTI, </a:t>
+            </a:r>
+            <a:r>
+              <a:rPr lang="en-US" sz="2800" dirty="0" err="1">
+                <a:solidFill>
+                  <a:schemeClr val="tx1">
+                    <a:lumMod val="65000"/>
+                    <a:lumOff val="35000"/>
+                  </a:schemeClr>
+                </a:solidFill>
+              </a:rPr>
+              <a:t>Básica</a:t>
+            </a:r>
+            <a:r>
+              <a:rPr lang="en-US" sz="2800" dirty="0">
+                <a:solidFill>
+                  <a:schemeClr val="tx1">
+                    <a:lumMod val="65000"/>
+                    <a:lumOff val="35000"/>
+                  </a:schemeClr>
+                </a:solidFill>
+              </a:rPr>
+              <a:t> y Media </a:t>
+            </a:r>
+          </a:p>
+          <a:p>
+            <a:pPr algn="ctr"/>
+            <a:r>
+              <a:rPr lang="en-US" sz="2800" b="1" dirty="0">
+                <a:solidFill>
+                  <a:srgbClr val="FF0000"/>
+                </a:solidFill>
+              </a:rPr>
+              <a:t>ALTO Y SUBIENDO</a:t>
+            </a:r>
+          </a:p>
+        </p:txBody>
+      </p:sp>
+      <p:sp>
+        <p:nvSpPr>
+          <p:cNvPr id="6" name="Rectangle 5">
+            <a:extLst>
+              <a:ext uri="{FF2B5EF4-FFF2-40B4-BE49-F238E27FC236}">
+                <a16:creationId xmlns:a16="http://schemas.microsoft.com/office/drawing/2014/main" id="{123C3ADC-F344-EC47-BE69-A5C7C2F032A1}"/>
+              </a:ext>
+            </a:extLst>
+          </p:cNvPr>
+          <p:cNvSpPr/>
+          <p:nvPr/>
+        </p:nvSpPr>
+        <p:spPr>
+          <a:xfrm>
+            <a:off x="6825529" y="1614877"/>
+            <a:ext cx="4823999" cy="1292662"/>
+          </a:xfrm>
+          <a:prstGeom prst="rect">
+            <a:avLst/>
+          </a:prstGeom>
+          <a:ln>
+            <a:solidFill>
+              <a:schemeClr val="tx1">
+                <a:lumMod val="50000"/>
+                <a:lumOff val="50000"/>
+              </a:schemeClr>
+            </a:solidFill>
+          </a:ln>
+        </p:spPr>
+        <p:txBody>
+          <a:bodyPr wrap="square">
+            <a:spAutoFit/>
+          </a:bodyPr>
+          <a:lstStyle/>
+          <a:p>
+            <a:pPr algn="ctr"/>
+            <a:r>
+              <a:rPr lang="en-US" sz="3200" dirty="0" err="1">
+                <a:solidFill>
+                  <a:schemeClr val="tx1">
+                    <a:lumMod val="65000"/>
+                    <a:lumOff val="35000"/>
+                  </a:schemeClr>
+                </a:solidFill>
+              </a:rPr>
+              <a:t>Fallecidos</a:t>
+            </a:r>
+            <a:r>
+              <a:rPr lang="en-US" sz="3200" dirty="0">
+                <a:solidFill>
+                  <a:schemeClr val="tx1">
+                    <a:lumMod val="65000"/>
+                    <a:lumOff val="35000"/>
+                  </a:schemeClr>
+                </a:solidFill>
+              </a:rPr>
+              <a:t> </a:t>
+            </a:r>
+            <a:r>
+              <a:rPr lang="en-US" sz="3200" dirty="0" err="1">
+                <a:solidFill>
+                  <a:schemeClr val="tx1">
+                    <a:lumMod val="65000"/>
+                    <a:lumOff val="35000"/>
+                  </a:schemeClr>
+                </a:solidFill>
+              </a:rPr>
+              <a:t>semanales</a:t>
+            </a:r>
+            <a:endParaRPr lang="en-US" sz="3200" dirty="0">
+              <a:solidFill>
+                <a:schemeClr val="tx1">
+                  <a:lumMod val="65000"/>
+                  <a:lumOff val="35000"/>
+                </a:schemeClr>
+              </a:solidFill>
+            </a:endParaRPr>
+          </a:p>
+          <a:p>
+            <a:pPr algn="ctr"/>
+            <a:endParaRPr lang="en-US" dirty="0"/>
+          </a:p>
+          <a:p>
+            <a:pPr algn="ctr"/>
+            <a:r>
+              <a:rPr lang="en-US" sz="2800" b="1" dirty="0">
+                <a:solidFill>
+                  <a:srgbClr val="FF0000"/>
+                </a:solidFill>
+              </a:rPr>
+              <a:t>ALTO Y SUBIENDO</a:t>
+            </a:r>
+            <a:endParaRPr lang="en-US" sz="2800" b="1" dirty="0">
+              <a:solidFill>
+                <a:srgbClr val="00417C"/>
+              </a:solidFill>
+            </a:endParaRPr>
+          </a:p>
+        </p:txBody>
+      </p:sp>
+      <p:sp>
+        <p:nvSpPr>
+          <p:cNvPr id="8" name="Rectangle 7">
+            <a:extLst>
+              <a:ext uri="{FF2B5EF4-FFF2-40B4-BE49-F238E27FC236}">
+                <a16:creationId xmlns:a16="http://schemas.microsoft.com/office/drawing/2014/main" id="{0811E62D-18FC-C040-AC7D-3ACBA4D09B8E}"/>
+              </a:ext>
+            </a:extLst>
+          </p:cNvPr>
+          <p:cNvSpPr/>
+          <p:nvPr/>
+        </p:nvSpPr>
+        <p:spPr>
+          <a:xfrm>
+            <a:off x="1925460" y="4082746"/>
+            <a:ext cx="8937827" cy="1723549"/>
+          </a:xfrm>
+          <a:prstGeom prst="rect">
+            <a:avLst/>
+          </a:prstGeom>
+          <a:ln>
+            <a:solidFill>
+              <a:schemeClr val="tx1">
+                <a:lumMod val="50000"/>
+                <a:lumOff val="50000"/>
+              </a:schemeClr>
+            </a:solidFill>
+          </a:ln>
+        </p:spPr>
+        <p:txBody>
+          <a:bodyPr wrap="square">
+            <a:spAutoFit/>
+          </a:bodyPr>
+          <a:lstStyle/>
+          <a:p>
+            <a:pPr algn="ctr"/>
+            <a:r>
+              <a:rPr lang="en-US" sz="3200" dirty="0">
+                <a:solidFill>
+                  <a:schemeClr val="tx1">
+                    <a:lumMod val="65000"/>
+                    <a:lumOff val="35000"/>
+                  </a:schemeClr>
+                </a:solidFill>
+              </a:rPr>
+              <a:t>NIVEL DE CONTAGIOS</a:t>
+            </a:r>
+          </a:p>
+          <a:p>
+            <a:pPr algn="ctr"/>
+            <a:endParaRPr lang="en-US" dirty="0"/>
+          </a:p>
+          <a:p>
+            <a:pPr algn="ctr"/>
+            <a:r>
+              <a:rPr lang="en-US" sz="2800" b="1" dirty="0">
+                <a:solidFill>
+                  <a:srgbClr val="FF0000"/>
+                </a:solidFill>
+              </a:rPr>
+              <a:t>MUY ALTO EN TODAS LAS REGIONES</a:t>
+            </a:r>
+          </a:p>
+          <a:p>
+            <a:pPr algn="ctr"/>
+            <a:r>
+              <a:rPr lang="en-US" sz="2800" b="1" dirty="0">
+                <a:solidFill>
+                  <a:srgbClr val="FF0000"/>
+                </a:solidFill>
+              </a:rPr>
+              <a:t>SUBIENDO EN MUCHAS REGIONES</a:t>
+            </a:r>
+            <a:endParaRPr lang="en-US" dirty="0"/>
+          </a:p>
+        </p:txBody>
+      </p:sp>
+    </p:spTree>
+    <p:extLst>
+      <p:ext uri="{BB962C8B-B14F-4D97-AF65-F5344CB8AC3E}">
+        <p14:creationId xmlns:p14="http://schemas.microsoft.com/office/powerpoint/2010/main" val="319308570"/>
+      </p:ext>
+    </p:extLst>
+  </p:cSld>
+  <p:clrMapOvr>
+    <a:masterClrMapping/>
+  </p:clrMapOvr>
+</p:sld>
+</file>
+
+<file path=ppt/slides/slide25.xml><?xml version="1.0" encoding="utf-8"?>
+<p:sld xmlns:a="http://schemas.openxmlformats.org/drawingml/2006/main" xmlns:r="http://schemas.openxmlformats.org/officeDocument/2006/relationships" xmlns:p="http://schemas.openxmlformats.org/presentationml/2006/main">
+  <p:cSld>
+    <p:spTree>
+      <p:nvGrpSpPr>
+        <p:cNvPr id="1" name=""/>
+        <p:cNvGrpSpPr/>
+        <p:nvPr/>
+      </p:nvGrpSpPr>
+      <p:grpSpPr>
+        <a:xfrm>
+          <a:off x="0" y="0"/>
+          <a:ext cx="0" cy="0"/>
+          <a:chOff x="0" y="0"/>
+          <a:chExt cx="0" cy="0"/>
+        </a:xfrm>
+      </p:grpSpPr>
+      <p:sp>
+        <p:nvSpPr>
+          <p:cNvPr id="4" name="TextBox 3">
+            <a:extLst>
+              <a:ext uri="{FF2B5EF4-FFF2-40B4-BE49-F238E27FC236}">
+                <a16:creationId xmlns:a16="http://schemas.microsoft.com/office/drawing/2014/main" id="{5BCAFE7A-E299-D14E-9413-EB5C984AF441}"/>
+              </a:ext>
+            </a:extLst>
+          </p:cNvPr>
+          <p:cNvSpPr txBox="1"/>
+          <p:nvPr/>
+        </p:nvSpPr>
+        <p:spPr>
+          <a:xfrm>
+            <a:off x="3621059" y="2846895"/>
+            <a:ext cx="4476610" cy="1015663"/>
+          </a:xfrm>
+          <a:prstGeom prst="rect">
+            <a:avLst/>
+          </a:prstGeom>
+          <a:noFill/>
+        </p:spPr>
+        <p:txBody>
+          <a:bodyPr wrap="none" rtlCol="0">
+            <a:spAutoFit/>
+          </a:bodyPr>
+          <a:lstStyle/>
+          <a:p>
+            <a:r>
+              <a:rPr lang="en-US" sz="6000" dirty="0"/>
+              <a:t>VACUNACIÓN</a:t>
+            </a:r>
+          </a:p>
+        </p:txBody>
+      </p:sp>
+      <p:sp>
+        <p:nvSpPr>
+          <p:cNvPr id="5" name="Title 4">
+            <a:extLst>
+              <a:ext uri="{FF2B5EF4-FFF2-40B4-BE49-F238E27FC236}">
+                <a16:creationId xmlns:a16="http://schemas.microsoft.com/office/drawing/2014/main" id="{5B465201-ED47-B64A-B505-4DDA25649C32}"/>
+              </a:ext>
+            </a:extLst>
+          </p:cNvPr>
+          <p:cNvSpPr>
+            <a:spLocks noGrp="1"/>
+          </p:cNvSpPr>
+          <p:nvPr>
+            <p:ph type="title"/>
+          </p:nvPr>
+        </p:nvSpPr>
+        <p:spPr/>
+        <p:txBody>
+          <a:bodyPr/>
+          <a:lstStyle/>
+          <a:p>
+            <a:endParaRPr lang="en-US"/>
+          </a:p>
+        </p:txBody>
+      </p:sp>
+    </p:spTree>
+    <p:extLst>
+      <p:ext uri="{BB962C8B-B14F-4D97-AF65-F5344CB8AC3E}">
+        <p14:creationId xmlns:p14="http://schemas.microsoft.com/office/powerpoint/2010/main" val="568400835"/>
+      </p:ext>
+    </p:extLst>
+  </p:cSld>
+  <p:clrMapOvr>
+    <a:masterClrMapping/>
+  </p:clrMapOvr>
+</p:sld>
+</file>
+
+<file path=ppt/slides/slide26.xml><?xml version="1.0" encoding="utf-8"?>
+<p:sld xmlns:a="http://schemas.openxmlformats.org/drawingml/2006/main" xmlns:r="http://schemas.openxmlformats.org/officeDocument/2006/relationships" xmlns:p="http://schemas.openxmlformats.org/presentationml/2006/main">
+  <p:cSld>
+    <p:spTree>
+      <p:nvGrpSpPr>
+        <p:cNvPr id="1" name=""/>
+        <p:cNvGrpSpPr/>
+        <p:nvPr/>
+      </p:nvGrpSpPr>
+      <p:grpSpPr>
+        <a:xfrm>
+          <a:off x="0" y="0"/>
+          <a:ext cx="0" cy="0"/>
+          <a:chOff x="0" y="0"/>
+          <a:chExt cx="0" cy="0"/>
+        </a:xfrm>
+      </p:grpSpPr>
+      <p:sp>
+        <p:nvSpPr>
           <p:cNvPr id="9" name="TextBox 8">
             <a:extLst>
               <a:ext uri="{FF2B5EF4-FFF2-40B4-BE49-F238E27FC236}">
@@ -7468,7 +8872,7 @@
 </p:sld>
 </file>
 
-<file path=ppt/slides/slide24.xml><?xml version="1.0" encoding="utf-8"?>
+<file path=ppt/slides/slide27.xml><?xml version="1.0" encoding="utf-8"?>
 <p:sld xmlns:a="http://schemas.openxmlformats.org/drawingml/2006/main" xmlns:r="http://schemas.openxmlformats.org/officeDocument/2006/relationships" xmlns:p="http://schemas.openxmlformats.org/presentationml/2006/main">
   <p:cSld>
     <p:spTree>
@@ -8217,7 +9621,7 @@
 </p:sld>
 </file>
 
-<file path=ppt/slides/slide25.xml><?xml version="1.0" encoding="utf-8"?>
+<file path=ppt/slides/slide28.xml><?xml version="1.0" encoding="utf-8"?>
 <p:sld xmlns:a="http://schemas.openxmlformats.org/drawingml/2006/main" xmlns:r="http://schemas.openxmlformats.org/officeDocument/2006/relationships" xmlns:p="http://schemas.openxmlformats.org/presentationml/2006/main">
   <p:cSld>
     <p:spTree>

</xml_diff>